<commit_message>
Add design to provide executables for master and slave
</commit_message>
<xml_diff>
--- a/Design.pptx
+++ b/Design.pptx
@@ -6,6 +6,7 @@
   </p:sldMasterIdLst>
   <p:sldIdLst>
     <p:sldId id="256" r:id="rId2"/>
+    <p:sldId id="257" r:id="rId3"/>
   </p:sldIdLst>
   <p:sldSz cx="12192000" cy="6858000"/>
   <p:notesSz cx="6858000" cy="9144000"/>
@@ -104,6 +105,11 @@
       </a:defRPr>
     </a:lvl9pPr>
   </p:defaultTextStyle>
+  <p:extLst>
+    <p:ext uri="{EFAFB233-063F-42B5-8137-9DF3F51BA10A}">
+      <p15:sldGuideLst xmlns:p15="http://schemas.microsoft.com/office/powerpoint/2012/main"/>
+    </p:ext>
+  </p:extLst>
 </p:presentation>
 </file>
 
@@ -238,7 +244,7 @@
           <a:p>
             <a:fld id="{156D3C33-30DB-453C-903D-158315299F1C}" type="datetimeFigureOut">
               <a:rPr lang="ko-KR" altLang="en-US" smtClean="0"/>
-              <a:t>2020-10-20</a:t>
+              <a:t>2020-11-15</a:t>
             </a:fld>
             <a:endParaRPr lang="ko-KR" altLang="en-US"/>
           </a:p>
@@ -408,7 +414,7 @@
           <a:p>
             <a:fld id="{156D3C33-30DB-453C-903D-158315299F1C}" type="datetimeFigureOut">
               <a:rPr lang="ko-KR" altLang="en-US" smtClean="0"/>
-              <a:t>2020-10-20</a:t>
+              <a:t>2020-11-15</a:t>
             </a:fld>
             <a:endParaRPr lang="ko-KR" altLang="en-US"/>
           </a:p>
@@ -588,7 +594,7 @@
           <a:p>
             <a:fld id="{156D3C33-30DB-453C-903D-158315299F1C}" type="datetimeFigureOut">
               <a:rPr lang="ko-KR" altLang="en-US" smtClean="0"/>
-              <a:t>2020-10-20</a:t>
+              <a:t>2020-11-15</a:t>
             </a:fld>
             <a:endParaRPr lang="ko-KR" altLang="en-US"/>
           </a:p>
@@ -758,7 +764,7 @@
           <a:p>
             <a:fld id="{156D3C33-30DB-453C-903D-158315299F1C}" type="datetimeFigureOut">
               <a:rPr lang="ko-KR" altLang="en-US" smtClean="0"/>
-              <a:t>2020-10-20</a:t>
+              <a:t>2020-11-15</a:t>
             </a:fld>
             <a:endParaRPr lang="ko-KR" altLang="en-US"/>
           </a:p>
@@ -1004,7 +1010,7 @@
           <a:p>
             <a:fld id="{156D3C33-30DB-453C-903D-158315299F1C}" type="datetimeFigureOut">
               <a:rPr lang="ko-KR" altLang="en-US" smtClean="0"/>
-              <a:t>2020-10-20</a:t>
+              <a:t>2020-11-15</a:t>
             </a:fld>
             <a:endParaRPr lang="ko-KR" altLang="en-US"/>
           </a:p>
@@ -1236,7 +1242,7 @@
           <a:p>
             <a:fld id="{156D3C33-30DB-453C-903D-158315299F1C}" type="datetimeFigureOut">
               <a:rPr lang="ko-KR" altLang="en-US" smtClean="0"/>
-              <a:t>2020-10-20</a:t>
+              <a:t>2020-11-15</a:t>
             </a:fld>
             <a:endParaRPr lang="ko-KR" altLang="en-US"/>
           </a:p>
@@ -1603,7 +1609,7 @@
           <a:p>
             <a:fld id="{156D3C33-30DB-453C-903D-158315299F1C}" type="datetimeFigureOut">
               <a:rPr lang="ko-KR" altLang="en-US" smtClean="0"/>
-              <a:t>2020-10-20</a:t>
+              <a:t>2020-11-15</a:t>
             </a:fld>
             <a:endParaRPr lang="ko-KR" altLang="en-US"/>
           </a:p>
@@ -1721,7 +1727,7 @@
           <a:p>
             <a:fld id="{156D3C33-30DB-453C-903D-158315299F1C}" type="datetimeFigureOut">
               <a:rPr lang="ko-KR" altLang="en-US" smtClean="0"/>
-              <a:t>2020-10-20</a:t>
+              <a:t>2020-11-15</a:t>
             </a:fld>
             <a:endParaRPr lang="ko-KR" altLang="en-US"/>
           </a:p>
@@ -1816,7 +1822,7 @@
           <a:p>
             <a:fld id="{156D3C33-30DB-453C-903D-158315299F1C}" type="datetimeFigureOut">
               <a:rPr lang="ko-KR" altLang="en-US" smtClean="0"/>
-              <a:t>2020-10-20</a:t>
+              <a:t>2020-11-15</a:t>
             </a:fld>
             <a:endParaRPr lang="ko-KR" altLang="en-US"/>
           </a:p>
@@ -2093,7 +2099,7 @@
           <a:p>
             <a:fld id="{156D3C33-30DB-453C-903D-158315299F1C}" type="datetimeFigureOut">
               <a:rPr lang="ko-KR" altLang="en-US" smtClean="0"/>
-              <a:t>2020-10-20</a:t>
+              <a:t>2020-11-15</a:t>
             </a:fld>
             <a:endParaRPr lang="ko-KR" altLang="en-US"/>
           </a:p>
@@ -2346,7 +2352,7 @@
           <a:p>
             <a:fld id="{156D3C33-30DB-453C-903D-158315299F1C}" type="datetimeFigureOut">
               <a:rPr lang="ko-KR" altLang="en-US" smtClean="0"/>
-              <a:t>2020-10-20</a:t>
+              <a:t>2020-11-15</a:t>
             </a:fld>
             <a:endParaRPr lang="ko-KR" altLang="en-US"/>
           </a:p>
@@ -2559,7 +2565,7 @@
           <a:p>
             <a:fld id="{156D3C33-30DB-453C-903D-158315299F1C}" type="datetimeFigureOut">
               <a:rPr lang="ko-KR" altLang="en-US" smtClean="0"/>
-              <a:t>2020-10-20</a:t>
+              <a:t>2020-11-15</a:t>
             </a:fld>
             <a:endParaRPr lang="ko-KR" altLang="en-US"/>
           </a:p>
@@ -3139,6 +3145,217 @@
 </p:sld>
 </file>
 
+<file path=ppt/slides/slide2.xml><?xml version="1.0" encoding="utf-8"?>
+<p:sld xmlns:a="http://schemas.openxmlformats.org/drawingml/2006/main" xmlns:r="http://schemas.openxmlformats.org/officeDocument/2006/relationships" xmlns:p="http://schemas.openxmlformats.org/presentationml/2006/main">
+  <p:cSld>
+    <p:spTree>
+      <p:nvGrpSpPr>
+        <p:cNvPr id="1" name=""/>
+        <p:cNvGrpSpPr/>
+        <p:nvPr/>
+      </p:nvGrpSpPr>
+      <p:grpSpPr>
+        <a:xfrm>
+          <a:off x="0" y="0"/>
+          <a:ext cx="0" cy="0"/>
+          <a:chOff x="0" y="0"/>
+          <a:chExt cx="0" cy="0"/>
+        </a:xfrm>
+      </p:grpSpPr>
+      <p:sp>
+        <p:nvSpPr>
+          <p:cNvPr id="5" name="TextBox 4"/>
+          <p:cNvSpPr txBox="1"/>
+          <p:nvPr/>
+        </p:nvSpPr>
+        <p:spPr>
+          <a:xfrm>
+            <a:off x="620485" y="734786"/>
+            <a:ext cx="9135836" cy="2862322"/>
+          </a:xfrm>
+          <a:prstGeom prst="rect">
+            <a:avLst/>
+          </a:prstGeom>
+          <a:noFill/>
+        </p:spPr>
+        <p:txBody>
+          <a:bodyPr wrap="square" rtlCol="0">
+            <a:spAutoFit/>
+          </a:bodyPr>
+          <a:lstStyle/>
+          <a:p>
+            <a:r>
+              <a:rPr lang="ko-KR" altLang="en-US" smtClean="0"/>
+              <a:t>각각의 </a:t>
+            </a:r>
+            <a:r>
+              <a:rPr lang="en-US" altLang="ko-KR" smtClean="0"/>
+              <a:t>subproject master </a:t>
+            </a:r>
+            <a:r>
+              <a:rPr lang="ko-KR" altLang="en-US" smtClean="0"/>
+              <a:t>와 </a:t>
+            </a:r>
+            <a:r>
+              <a:rPr lang="en-US" altLang="ko-KR" smtClean="0"/>
+              <a:t>slave</a:t>
+            </a:r>
+            <a:r>
+              <a:rPr lang="ko-KR" altLang="en-US" smtClean="0"/>
+              <a:t>에서 </a:t>
+            </a:r>
+            <a:r>
+              <a:rPr lang="en-US" altLang="ko-KR" smtClean="0"/>
+              <a:t>executable </a:t>
+            </a:r>
+            <a:r>
+              <a:rPr lang="ko-KR" altLang="en-US" smtClean="0"/>
+              <a:t>제공하기</a:t>
+            </a:r>
+            <a:endParaRPr lang="en-US" altLang="ko-KR" smtClean="0"/>
+          </a:p>
+          <a:p>
+            <a:endParaRPr lang="en-US" altLang="ko-KR"/>
+          </a:p>
+          <a:p>
+            <a:r>
+              <a:rPr lang="en-US" altLang="ko-KR" smtClean="0"/>
+              <a:t>sbt plugin scala-assembly </a:t>
+            </a:r>
+            <a:r>
+              <a:rPr lang="ko-KR" altLang="en-US" smtClean="0"/>
+              <a:t>활용하기 </a:t>
+            </a:r>
+            <a:r>
+              <a:rPr lang="en-US" altLang="ko-KR" smtClean="0"/>
+              <a:t>(X): </a:t>
+            </a:r>
+            <a:r>
+              <a:rPr lang="ko-KR" altLang="en-US" smtClean="0"/>
+              <a:t>간단한 </a:t>
+            </a:r>
+            <a:r>
+              <a:rPr lang="en-US" altLang="ko-KR" smtClean="0"/>
+              <a:t>merge strategy</a:t>
+            </a:r>
+            <a:r>
+              <a:rPr lang="ko-KR" altLang="en-US" smtClean="0"/>
+              <a:t>를 사용할 경우에 </a:t>
+            </a:r>
+            <a:r>
+              <a:rPr lang="en-US" altLang="ko-KR" smtClean="0"/>
+              <a:t>log4j</a:t>
+            </a:r>
+            <a:r>
+              <a:rPr lang="ko-KR" altLang="en-US" smtClean="0"/>
+              <a:t>의 </a:t>
+            </a:r>
+            <a:r>
+              <a:rPr lang="en-US" altLang="ko-KR" smtClean="0"/>
+              <a:t>core dependency</a:t>
+            </a:r>
+            <a:r>
+              <a:rPr lang="ko-KR" altLang="en-US" smtClean="0"/>
+              <a:t>를 제대로 합칠 수가 없을 뿐만 아니라 </a:t>
+            </a:r>
+            <a:r>
+              <a:rPr lang="en-US" altLang="ko-KR" smtClean="0"/>
+              <a:t>dependency</a:t>
+            </a:r>
+            <a:r>
+              <a:rPr lang="ko-KR" altLang="en-US" smtClean="0"/>
+              <a:t>가 추가될 경우에 어떤 문제가 발생할 지 예측이 안됨</a:t>
+            </a:r>
+            <a:r>
+              <a:rPr lang="en-US" altLang="ko-KR" smtClean="0"/>
+              <a:t>.</a:t>
+            </a:r>
+          </a:p>
+          <a:p>
+            <a:r>
+              <a:rPr lang="en-US" altLang="ko-KR" smtClean="0">
+                <a:hlinkClick r:id="rId2"/>
+              </a:rPr>
+              <a:t>merge </a:t>
+            </a:r>
+            <a:r>
+              <a:rPr lang="ko-KR" altLang="en-US" smtClean="0">
+                <a:hlinkClick r:id="rId2"/>
+              </a:rPr>
+              <a:t>하는 방법</a:t>
+            </a:r>
+            <a:r>
+              <a:rPr lang="en-US" altLang="ko-KR" smtClean="0"/>
+              <a:t> </a:t>
+            </a:r>
+            <a:r>
+              <a:rPr lang="ko-KR" altLang="en-US" smtClean="0"/>
+              <a:t>에서 설명하는 대로 </a:t>
+            </a:r>
+            <a:r>
+              <a:rPr lang="en-US" altLang="ko-KR" smtClean="0"/>
+              <a:t>merge</a:t>
+            </a:r>
+            <a:r>
+              <a:rPr lang="ko-KR" altLang="en-US" smtClean="0"/>
+              <a:t>할 경우 다른 </a:t>
+            </a:r>
+            <a:r>
+              <a:rPr lang="en-US" altLang="ko-KR" smtClean="0"/>
+              <a:t>dependency</a:t>
+            </a:r>
+            <a:r>
+              <a:rPr lang="ko-KR" altLang="en-US" smtClean="0"/>
+              <a:t>에서 충돌함</a:t>
+            </a:r>
+            <a:r>
+              <a:rPr lang="en-US" altLang="ko-KR" smtClean="0"/>
+              <a:t>.</a:t>
+            </a:r>
+            <a:endParaRPr lang="en-US" altLang="ko-KR"/>
+          </a:p>
+          <a:p>
+            <a:endParaRPr lang="en-US" altLang="ko-KR" smtClean="0"/>
+          </a:p>
+          <a:p>
+            <a:endParaRPr lang="en-US" altLang="ko-KR"/>
+          </a:p>
+          <a:p>
+            <a:r>
+              <a:rPr lang="en-US" altLang="ko-KR" smtClean="0"/>
+              <a:t>sbt plugin scala-native-packager </a:t>
+            </a:r>
+            <a:r>
+              <a:rPr lang="ko-KR" altLang="en-US" smtClean="0"/>
+              <a:t>로 변경</a:t>
+            </a:r>
+            <a:endParaRPr lang="en-US" altLang="ko-KR" smtClean="0"/>
+          </a:p>
+          <a:p>
+            <a:endParaRPr lang="en-US" altLang="ko-KR"/>
+          </a:p>
+        </p:txBody>
+      </p:sp>
+    </p:spTree>
+    <p:extLst>
+      <p:ext uri="{BB962C8B-B14F-4D97-AF65-F5344CB8AC3E}">
+        <p14:creationId xmlns:p14="http://schemas.microsoft.com/office/powerpoint/2010/main" val="491864020"/>
+      </p:ext>
+    </p:extLst>
+  </p:cSld>
+  <p:clrMapOvr>
+    <a:masterClrMapping/>
+  </p:clrMapOvr>
+  <p:timing>
+    <p:tnLst>
+      <p:par>
+        <p:cTn id="1" dur="indefinite" restart="never" nodeType="tmRoot"/>
+      </p:par>
+    </p:tnLst>
+  </p:timing>
+</p:sld>
+</file>
+
 <file path=ppt/theme/theme1.xml><?xml version="1.0" encoding="utf-8"?>
 <a:theme xmlns:a="http://schemas.openxmlformats.org/drawingml/2006/main" name="Office 테마">
   <a:themeElements>

</xml_diff>

<commit_message>
Design range assigning for each node
</commit_message>
<xml_diff>
--- a/Design.pptx
+++ b/Design.pptx
@@ -5,8 +5,14 @@
     <p:sldMasterId id="2147483648" r:id="rId1"/>
   </p:sldMasterIdLst>
   <p:sldIdLst>
-    <p:sldId id="256" r:id="rId2"/>
-    <p:sldId id="257" r:id="rId3"/>
+    <p:sldId id="264" r:id="rId2"/>
+    <p:sldId id="263" r:id="rId3"/>
+    <p:sldId id="256" r:id="rId4"/>
+    <p:sldId id="257" r:id="rId5"/>
+    <p:sldId id="261" r:id="rId6"/>
+    <p:sldId id="258" r:id="rId7"/>
+    <p:sldId id="260" r:id="rId8"/>
+    <p:sldId id="259" r:id="rId9"/>
   </p:sldIdLst>
   <p:sldSz cx="12192000" cy="6858000"/>
   <p:notesSz cx="6858000" cy="9144000"/>
@@ -113,6 +119,18 @@
 </p:presentation>
 </file>
 
+<file path=ppt/commentAuthors.xml><?xml version="1.0" encoding="utf-8"?>
+<p:cmAuthorLst xmlns:a="http://schemas.openxmlformats.org/drawingml/2006/main" xmlns:r="http://schemas.openxmlformats.org/officeDocument/2006/relationships" xmlns:p="http://schemas.openxmlformats.org/presentationml/2006/main">
+  <p:cmAuthor id="1" name="Tomandjerry" initials="T" lastIdx="1" clrIdx="0">
+    <p:extLst>
+      <p:ext uri="{19B8F6BF-5375-455C-9EA6-DF929625EA0E}">
+        <p15:presenceInfo xmlns:p15="http://schemas.microsoft.com/office/powerpoint/2012/main" userId="Tomandjerry" providerId="None"/>
+      </p:ext>
+    </p:extLst>
+  </p:cmAuthor>
+</p:cmAuthorLst>
+</file>
+
 <file path=ppt/slideLayouts/slideLayout1.xml><?xml version="1.0" encoding="utf-8"?>
 <p:sldLayout xmlns:a="http://schemas.openxmlformats.org/drawingml/2006/main" xmlns:r="http://schemas.openxmlformats.org/officeDocument/2006/relationships" xmlns:p="http://schemas.openxmlformats.org/presentationml/2006/main" type="title" preserve="1">
   <p:cSld name="제목 슬라이드">
@@ -244,7 +262,7 @@
           <a:p>
             <a:fld id="{156D3C33-30DB-453C-903D-158315299F1C}" type="datetimeFigureOut">
               <a:rPr lang="ko-KR" altLang="en-US" smtClean="0"/>
-              <a:t>2020-11-15</a:t>
+              <a:t>2020-11-16</a:t>
             </a:fld>
             <a:endParaRPr lang="ko-KR" altLang="en-US"/>
           </a:p>
@@ -414,7 +432,7 @@
           <a:p>
             <a:fld id="{156D3C33-30DB-453C-903D-158315299F1C}" type="datetimeFigureOut">
               <a:rPr lang="ko-KR" altLang="en-US" smtClean="0"/>
-              <a:t>2020-11-15</a:t>
+              <a:t>2020-11-16</a:t>
             </a:fld>
             <a:endParaRPr lang="ko-KR" altLang="en-US"/>
           </a:p>
@@ -594,7 +612,7 @@
           <a:p>
             <a:fld id="{156D3C33-30DB-453C-903D-158315299F1C}" type="datetimeFigureOut">
               <a:rPr lang="ko-KR" altLang="en-US" smtClean="0"/>
-              <a:t>2020-11-15</a:t>
+              <a:t>2020-11-16</a:t>
             </a:fld>
             <a:endParaRPr lang="ko-KR" altLang="en-US"/>
           </a:p>
@@ -764,7 +782,7 @@
           <a:p>
             <a:fld id="{156D3C33-30DB-453C-903D-158315299F1C}" type="datetimeFigureOut">
               <a:rPr lang="ko-KR" altLang="en-US" smtClean="0"/>
-              <a:t>2020-11-15</a:t>
+              <a:t>2020-11-16</a:t>
             </a:fld>
             <a:endParaRPr lang="ko-KR" altLang="en-US"/>
           </a:p>
@@ -1010,7 +1028,7 @@
           <a:p>
             <a:fld id="{156D3C33-30DB-453C-903D-158315299F1C}" type="datetimeFigureOut">
               <a:rPr lang="ko-KR" altLang="en-US" smtClean="0"/>
-              <a:t>2020-11-15</a:t>
+              <a:t>2020-11-16</a:t>
             </a:fld>
             <a:endParaRPr lang="ko-KR" altLang="en-US"/>
           </a:p>
@@ -1242,7 +1260,7 @@
           <a:p>
             <a:fld id="{156D3C33-30DB-453C-903D-158315299F1C}" type="datetimeFigureOut">
               <a:rPr lang="ko-KR" altLang="en-US" smtClean="0"/>
-              <a:t>2020-11-15</a:t>
+              <a:t>2020-11-16</a:t>
             </a:fld>
             <a:endParaRPr lang="ko-KR" altLang="en-US"/>
           </a:p>
@@ -1609,7 +1627,7 @@
           <a:p>
             <a:fld id="{156D3C33-30DB-453C-903D-158315299F1C}" type="datetimeFigureOut">
               <a:rPr lang="ko-KR" altLang="en-US" smtClean="0"/>
-              <a:t>2020-11-15</a:t>
+              <a:t>2020-11-16</a:t>
             </a:fld>
             <a:endParaRPr lang="ko-KR" altLang="en-US"/>
           </a:p>
@@ -1727,7 +1745,7 @@
           <a:p>
             <a:fld id="{156D3C33-30DB-453C-903D-158315299F1C}" type="datetimeFigureOut">
               <a:rPr lang="ko-KR" altLang="en-US" smtClean="0"/>
-              <a:t>2020-11-15</a:t>
+              <a:t>2020-11-16</a:t>
             </a:fld>
             <a:endParaRPr lang="ko-KR" altLang="en-US"/>
           </a:p>
@@ -1822,7 +1840,7 @@
           <a:p>
             <a:fld id="{156D3C33-30DB-453C-903D-158315299F1C}" type="datetimeFigureOut">
               <a:rPr lang="ko-KR" altLang="en-US" smtClean="0"/>
-              <a:t>2020-11-15</a:t>
+              <a:t>2020-11-16</a:t>
             </a:fld>
             <a:endParaRPr lang="ko-KR" altLang="en-US"/>
           </a:p>
@@ -2099,7 +2117,7 @@
           <a:p>
             <a:fld id="{156D3C33-30DB-453C-903D-158315299F1C}" type="datetimeFigureOut">
               <a:rPr lang="ko-KR" altLang="en-US" smtClean="0"/>
-              <a:t>2020-11-15</a:t>
+              <a:t>2020-11-16</a:t>
             </a:fld>
             <a:endParaRPr lang="ko-KR" altLang="en-US"/>
           </a:p>
@@ -2352,7 +2370,7 @@
           <a:p>
             <a:fld id="{156D3C33-30DB-453C-903D-158315299F1C}" type="datetimeFigureOut">
               <a:rPr lang="ko-KR" altLang="en-US" smtClean="0"/>
-              <a:t>2020-11-15</a:t>
+              <a:t>2020-11-16</a:t>
             </a:fld>
             <a:endParaRPr lang="ko-KR" altLang="en-US"/>
           </a:p>
@@ -2565,7 +2583,7 @@
           <a:p>
             <a:fld id="{156D3C33-30DB-453C-903D-158315299F1C}" type="datetimeFigureOut">
               <a:rPr lang="ko-KR" altLang="en-US" smtClean="0"/>
-              <a:t>2020-11-15</a:t>
+              <a:t>2020-11-16</a:t>
             </a:fld>
             <a:endParaRPr lang="ko-KR" altLang="en-US"/>
           </a:p>
@@ -2979,7 +2997,7 @@
         <p:spPr>
           <a:xfrm>
             <a:off x="620485" y="734786"/>
-            <a:ext cx="9135836" cy="2308324"/>
+            <a:ext cx="9135836" cy="1754326"/>
           </a:xfrm>
           <a:prstGeom prst="rect">
             <a:avLst/>
@@ -2994,86 +3012,7 @@
           <a:p>
             <a:r>
               <a:rPr lang="ko-KR" altLang="en-US" smtClean="0"/>
-              <a:t>프로젝트 셋업 형태</a:t>
-            </a:r>
-            <a:r>
-              <a:rPr lang="en-US" altLang="ko-KR" smtClean="0"/>
-              <a:t>:</a:t>
-            </a:r>
-            <a:r>
-              <a:rPr lang="ko-KR" altLang="en-US" smtClean="0"/>
-              <a:t> </a:t>
-            </a:r>
-            <a:r>
-              <a:rPr lang="en-US" altLang="ko-KR" smtClean="0"/>
-              <a:t>Master </a:t>
-            </a:r>
-            <a:r>
-              <a:rPr lang="ko-KR" altLang="en-US" smtClean="0"/>
-              <a:t>와 </a:t>
-            </a:r>
-            <a:r>
-              <a:rPr lang="en-US" altLang="ko-KR" smtClean="0"/>
-              <a:t>Slave </a:t>
-            </a:r>
-            <a:r>
-              <a:rPr lang="ko-KR" altLang="en-US" smtClean="0"/>
-              <a:t>두 개의 서브프로젝트 설정</a:t>
-            </a:r>
-            <a:endParaRPr lang="en-US" altLang="ko-KR" smtClean="0"/>
-          </a:p>
-          <a:p>
-            <a:r>
-              <a:rPr lang="ko-KR" altLang="en-US" smtClean="0"/>
-              <a:t>공통 컴포넌트가 많아질 경우 </a:t>
-            </a:r>
-            <a:r>
-              <a:rPr lang="en-US" altLang="ko-KR" smtClean="0"/>
-              <a:t>Common </a:t>
-            </a:r>
-            <a:r>
-              <a:rPr lang="ko-KR" altLang="en-US" smtClean="0"/>
-              <a:t>서브프로젝트를 공유하게 할 예정</a:t>
-            </a:r>
-            <a:endParaRPr lang="en-US" altLang="ko-KR" smtClean="0"/>
-          </a:p>
-          <a:p>
-            <a:endParaRPr lang="en-US" altLang="ko-KR"/>
-          </a:p>
-          <a:p>
-            <a:r>
-              <a:rPr lang="en-US" altLang="ko-KR" smtClean="0"/>
-              <a:t>Master</a:t>
-            </a:r>
-            <a:r>
-              <a:rPr lang="ko-KR" altLang="en-US" smtClean="0"/>
-              <a:t>와 </a:t>
-            </a:r>
-            <a:r>
-              <a:rPr lang="en-US" altLang="ko-KR" smtClean="0"/>
-              <a:t>Slave</a:t>
-            </a:r>
-            <a:r>
-              <a:rPr lang="ko-KR" altLang="en-US" smtClean="0"/>
-              <a:t>를 따로 패키징할 수 있도록 프로젝트 분리함</a:t>
-            </a:r>
-            <a:endParaRPr lang="en-US" altLang="ko-KR" smtClean="0"/>
-          </a:p>
-          <a:p>
-            <a:endParaRPr lang="en-US" altLang="ko-KR"/>
-          </a:p>
-          <a:p>
-            <a:r>
-              <a:rPr lang="ko-KR" altLang="en-US" smtClean="0"/>
-              <a:t>먼저 간단한 단방향 데이터조회는 </a:t>
-            </a:r>
-            <a:r>
-              <a:rPr lang="en-US" altLang="ko-KR" smtClean="0"/>
-              <a:t>RPC</a:t>
-            </a:r>
-            <a:r>
-              <a:rPr lang="ko-KR" altLang="en-US" smtClean="0"/>
-              <a:t>를 통해서</a:t>
+              <a:t>프로젝트에서 섹션을 나누고</a:t>
             </a:r>
             <a:r>
               <a:rPr lang="en-US" altLang="ko-KR" smtClean="0"/>
@@ -3081,45 +3020,104 @@
             </a:r>
             <a:r>
               <a:rPr lang="ko-KR" altLang="en-US" smtClean="0"/>
-              <a:t>쌍방향 연결은 </a:t>
+              <a:t>해당 섹션의 디자인이 끝날 때마다 구현한다</a:t>
+            </a:r>
+            <a:endParaRPr lang="en-US" altLang="ko-KR" smtClean="0"/>
+          </a:p>
+          <a:p>
+            <a:r>
+              <a:rPr lang="ko-KR" altLang="en-US" smtClean="0"/>
+              <a:t>오래 생각해보고</a:t>
             </a:r>
             <a:r>
               <a:rPr lang="en-US" altLang="ko-KR" smtClean="0"/>
-              <a:t>GRPC Stream</a:t>
-            </a:r>
-            <a:r>
-              <a:rPr lang="ko-KR" altLang="en-US" smtClean="0"/>
-              <a:t>으로 할 예정이다</a:t>
+              <a:t>, </a:t>
+            </a:r>
+            <a:r>
+              <a:rPr lang="ko-KR" altLang="en-US" smtClean="0"/>
+              <a:t>해당 세션이 독립적으로 구현될 수 있을 때까지는 디자인만 한다</a:t>
+            </a:r>
+            <a:endParaRPr lang="en-US" altLang="ko-KR" smtClean="0"/>
+          </a:p>
+          <a:p>
+            <a:endParaRPr lang="en-US" altLang="ko-KR"/>
+          </a:p>
+          <a:p>
+            <a:r>
+              <a:rPr lang="ko-KR" altLang="en-US" smtClean="0"/>
+              <a:t>마일스톤 </a:t>
             </a:r>
             <a:r>
               <a:rPr lang="en-US" altLang="ko-KR" smtClean="0"/>
-              <a:t>. </a:t>
-            </a:r>
-            <a:r>
-              <a:rPr lang="ko-KR" altLang="en-US" smtClean="0"/>
-              <a:t>통신할 때의 데이터 직렬화는 </a:t>
+              <a:t>1(10</a:t>
+            </a:r>
+            <a:r>
+              <a:rPr lang="ko-KR" altLang="en-US" smtClean="0"/>
+              <a:t>월 </a:t>
             </a:r>
             <a:r>
               <a:rPr lang="en-US" altLang="ko-KR" smtClean="0"/>
-              <a:t>Protobuf</a:t>
-            </a:r>
-            <a:r>
-              <a:rPr lang="ko-KR" altLang="en-US" smtClean="0"/>
-              <a:t>를 활용한다</a:t>
+              <a:t>19</a:t>
+            </a:r>
+            <a:r>
+              <a:rPr lang="ko-KR" altLang="en-US" smtClean="0"/>
+              <a:t>일 </a:t>
             </a:r>
             <a:r>
               <a:rPr lang="en-US" altLang="ko-KR" smtClean="0"/>
-              <a:t>.</a:t>
-            </a:r>
-          </a:p>
-          <a:p>
+              <a:t>11:59pm)</a:t>
+            </a:r>
+          </a:p>
+          <a:p>
+            <a:r>
+              <a:rPr lang="ko-KR" altLang="en-US" smtClean="0"/>
+              <a:t>마일스톤 </a:t>
+            </a:r>
             <a:r>
               <a:rPr lang="en-US" altLang="ko-KR" smtClean="0"/>
-              <a:t>=&gt; </a:t>
-            </a:r>
-            <a:r>
-              <a:rPr lang="ko-KR" altLang="en-US" smtClean="0"/>
-              <a:t>의존하는 라이브러리의 개수를 줄이기 위함</a:t>
+              <a:t>2(11</a:t>
+            </a:r>
+            <a:r>
+              <a:rPr lang="ko-KR" altLang="en-US" smtClean="0"/>
+              <a:t>월 </a:t>
+            </a:r>
+            <a:r>
+              <a:rPr lang="en-US" altLang="ko-KR" smtClean="0"/>
+              <a:t>16</a:t>
+            </a:r>
+            <a:r>
+              <a:rPr lang="ko-KR" altLang="en-US" smtClean="0"/>
+              <a:t>일 </a:t>
+            </a:r>
+            <a:r>
+              <a:rPr lang="en-US" altLang="ko-KR" smtClean="0"/>
+              <a:t>11:59pm)</a:t>
+            </a:r>
+          </a:p>
+          <a:p>
+            <a:r>
+              <a:rPr lang="ko-KR" altLang="en-US" smtClean="0"/>
+              <a:t>마일스톤 </a:t>
+            </a:r>
+            <a:r>
+              <a:rPr lang="en-US" altLang="ko-KR" smtClean="0"/>
+              <a:t>3(12</a:t>
+            </a:r>
+            <a:r>
+              <a:rPr lang="ko-KR" altLang="en-US" smtClean="0"/>
+              <a:t>월 </a:t>
+            </a:r>
+            <a:r>
+              <a:rPr lang="en-US" altLang="ko-KR" smtClean="0"/>
+              <a:t>14</a:t>
+            </a:r>
+            <a:r>
+              <a:rPr lang="ko-KR" altLang="en-US" smtClean="0"/>
+              <a:t>일 </a:t>
+            </a:r>
+            <a:r>
+              <a:rPr lang="en-US" altLang="ko-KR" smtClean="0"/>
+              <a:t>11:59pm)</a:t>
             </a:r>
             <a:endParaRPr lang="en-US" altLang="ko-KR" smtClean="0"/>
           </a:p>
@@ -3128,7 +3126,7 @@
     </p:spTree>
     <p:extLst>
       <p:ext uri="{BB962C8B-B14F-4D97-AF65-F5344CB8AC3E}">
-        <p14:creationId xmlns:p14="http://schemas.microsoft.com/office/powerpoint/2010/main" val="2145348254"/>
+        <p14:creationId xmlns:p14="http://schemas.microsoft.com/office/powerpoint/2010/main" val="1997132162"/>
       </p:ext>
     </p:extLst>
   </p:cSld>
@@ -3164,6 +3162,312 @@
       </p:grpSpPr>
       <p:sp>
         <p:nvSpPr>
+          <p:cNvPr id="2" name="직사각형 1"/>
+          <p:cNvSpPr/>
+          <p:nvPr/>
+        </p:nvSpPr>
+        <p:spPr>
+          <a:xfrm>
+            <a:off x="638256" y="2902021"/>
+            <a:ext cx="10386177" cy="707886"/>
+          </a:xfrm>
+          <a:prstGeom prst="rect">
+            <a:avLst/>
+          </a:prstGeom>
+          <a:noFill/>
+        </p:spPr>
+        <p:txBody>
+          <a:bodyPr wrap="none" lIns="91440" tIns="45720" rIns="91440" bIns="45720">
+            <a:spAutoFit/>
+          </a:bodyPr>
+          <a:lstStyle/>
+          <a:p>
+            <a:r>
+              <a:rPr lang="en-US" altLang="ko-KR" sz="4000">
+                <a:ln w="0"/>
+                <a:effectLst>
+                  <a:outerShdw blurRad="38100" dist="19050" dir="2700000" algn="tl" rotWithShape="0">
+                    <a:schemeClr val="dk1">
+                      <a:alpha val="40000"/>
+                    </a:schemeClr>
+                  </a:outerShdw>
+                </a:effectLst>
+              </a:rPr>
+              <a:t>1</a:t>
+            </a:r>
+            <a:r>
+              <a:rPr lang="en-US" altLang="ko-KR" sz="4000" smtClean="0">
+                <a:ln w="0"/>
+                <a:effectLst>
+                  <a:outerShdw blurRad="38100" dist="19050" dir="2700000" algn="tl" rotWithShape="0">
+                    <a:schemeClr val="dk1">
+                      <a:alpha val="40000"/>
+                    </a:schemeClr>
+                  </a:outerShdw>
+                </a:effectLst>
+              </a:rPr>
+              <a:t>. </a:t>
+            </a:r>
+            <a:r>
+              <a:rPr lang="ko-KR" altLang="en-US" sz="4000" smtClean="0">
+                <a:ln w="0"/>
+                <a:effectLst>
+                  <a:outerShdw blurRad="38100" dist="19050" dir="2700000" algn="tl" rotWithShape="0">
+                    <a:schemeClr val="dk1">
+                      <a:alpha val="40000"/>
+                    </a:schemeClr>
+                  </a:outerShdw>
+                </a:effectLst>
+              </a:rPr>
+              <a:t>프로젝트 설정 및 이용할 라이브러리 선택</a:t>
+            </a:r>
+            <a:endParaRPr lang="en-US" altLang="ko-KR" sz="4000" b="0" cap="none" spc="0">
+              <a:ln w="0"/>
+              <a:solidFill>
+                <a:schemeClr val="tx1"/>
+              </a:solidFill>
+              <a:effectLst>
+                <a:outerShdw blurRad="38100" dist="19050" dir="2700000" algn="tl" rotWithShape="0">
+                  <a:schemeClr val="dk1">
+                    <a:alpha val="40000"/>
+                  </a:schemeClr>
+                </a:outerShdw>
+              </a:effectLst>
+            </a:endParaRPr>
+          </a:p>
+        </p:txBody>
+      </p:sp>
+    </p:spTree>
+    <p:extLst>
+      <p:ext uri="{BB962C8B-B14F-4D97-AF65-F5344CB8AC3E}">
+        <p14:creationId xmlns:p14="http://schemas.microsoft.com/office/powerpoint/2010/main" val="947472565"/>
+      </p:ext>
+    </p:extLst>
+  </p:cSld>
+  <p:clrMapOvr>
+    <a:masterClrMapping/>
+  </p:clrMapOvr>
+  <p:timing>
+    <p:tnLst>
+      <p:par>
+        <p:cTn id="1" dur="indefinite" restart="never" nodeType="tmRoot"/>
+      </p:par>
+    </p:tnLst>
+  </p:timing>
+</p:sld>
+</file>
+
+<file path=ppt/slides/slide3.xml><?xml version="1.0" encoding="utf-8"?>
+<p:sld xmlns:a="http://schemas.openxmlformats.org/drawingml/2006/main" xmlns:r="http://schemas.openxmlformats.org/officeDocument/2006/relationships" xmlns:p="http://schemas.openxmlformats.org/presentationml/2006/main">
+  <p:cSld>
+    <p:spTree>
+      <p:nvGrpSpPr>
+        <p:cNvPr id="1" name=""/>
+        <p:cNvGrpSpPr/>
+        <p:nvPr/>
+      </p:nvGrpSpPr>
+      <p:grpSpPr>
+        <a:xfrm>
+          <a:off x="0" y="0"/>
+          <a:ext cx="0" cy="0"/>
+          <a:chOff x="0" y="0"/>
+          <a:chExt cx="0" cy="0"/>
+        </a:xfrm>
+      </p:grpSpPr>
+      <p:sp>
+        <p:nvSpPr>
+          <p:cNvPr id="5" name="TextBox 4"/>
+          <p:cNvSpPr txBox="1"/>
+          <p:nvPr/>
+        </p:nvSpPr>
+        <p:spPr>
+          <a:xfrm>
+            <a:off x="620485" y="734786"/>
+            <a:ext cx="9135836" cy="2308324"/>
+          </a:xfrm>
+          <a:prstGeom prst="rect">
+            <a:avLst/>
+          </a:prstGeom>
+          <a:noFill/>
+        </p:spPr>
+        <p:txBody>
+          <a:bodyPr wrap="square" rtlCol="0">
+            <a:spAutoFit/>
+          </a:bodyPr>
+          <a:lstStyle/>
+          <a:p>
+            <a:r>
+              <a:rPr lang="ko-KR" altLang="en-US" smtClean="0"/>
+              <a:t>프로젝트 셋업 형태</a:t>
+            </a:r>
+            <a:r>
+              <a:rPr lang="en-US" altLang="ko-KR" smtClean="0"/>
+              <a:t>:</a:t>
+            </a:r>
+            <a:r>
+              <a:rPr lang="ko-KR" altLang="en-US" smtClean="0"/>
+              <a:t> </a:t>
+            </a:r>
+            <a:r>
+              <a:rPr lang="en-US" altLang="ko-KR" smtClean="0"/>
+              <a:t>Master </a:t>
+            </a:r>
+            <a:r>
+              <a:rPr lang="ko-KR" altLang="en-US" smtClean="0"/>
+              <a:t>와 </a:t>
+            </a:r>
+            <a:r>
+              <a:rPr lang="en-US" altLang="ko-KR" smtClean="0"/>
+              <a:t>Slave </a:t>
+            </a:r>
+            <a:r>
+              <a:rPr lang="ko-KR" altLang="en-US" smtClean="0"/>
+              <a:t>두 개의 서브프로젝트 설정</a:t>
+            </a:r>
+            <a:endParaRPr lang="en-US" altLang="ko-KR" smtClean="0"/>
+          </a:p>
+          <a:p>
+            <a:r>
+              <a:rPr lang="ko-KR" altLang="en-US" smtClean="0"/>
+              <a:t>공통 컴포넌트가 많아질 경우 </a:t>
+            </a:r>
+            <a:r>
+              <a:rPr lang="en-US" altLang="ko-KR" smtClean="0"/>
+              <a:t>Common </a:t>
+            </a:r>
+            <a:r>
+              <a:rPr lang="ko-KR" altLang="en-US" smtClean="0"/>
+              <a:t>서브프로젝트를 공유하게 할 예정</a:t>
+            </a:r>
+            <a:endParaRPr lang="en-US" altLang="ko-KR" smtClean="0"/>
+          </a:p>
+          <a:p>
+            <a:endParaRPr lang="en-US" altLang="ko-KR"/>
+          </a:p>
+          <a:p>
+            <a:r>
+              <a:rPr lang="en-US" altLang="ko-KR" smtClean="0"/>
+              <a:t>Master</a:t>
+            </a:r>
+            <a:r>
+              <a:rPr lang="ko-KR" altLang="en-US" smtClean="0"/>
+              <a:t>와 </a:t>
+            </a:r>
+            <a:r>
+              <a:rPr lang="en-US" altLang="ko-KR" smtClean="0"/>
+              <a:t>Slave</a:t>
+            </a:r>
+            <a:r>
+              <a:rPr lang="ko-KR" altLang="en-US" smtClean="0"/>
+              <a:t>를 따로 패키징할 수 있도록 프로젝트 분리함</a:t>
+            </a:r>
+            <a:endParaRPr lang="en-US" altLang="ko-KR" smtClean="0"/>
+          </a:p>
+          <a:p>
+            <a:endParaRPr lang="en-US" altLang="ko-KR"/>
+          </a:p>
+          <a:p>
+            <a:r>
+              <a:rPr lang="ko-KR" altLang="en-US" smtClean="0"/>
+              <a:t>먼저 간단한 단방향 데이터조회는 </a:t>
+            </a:r>
+            <a:r>
+              <a:rPr lang="en-US" altLang="ko-KR" smtClean="0"/>
+              <a:t>RPC</a:t>
+            </a:r>
+            <a:r>
+              <a:rPr lang="ko-KR" altLang="en-US" smtClean="0"/>
+              <a:t>를 통해서</a:t>
+            </a:r>
+            <a:r>
+              <a:rPr lang="en-US" altLang="ko-KR" smtClean="0"/>
+              <a:t>, </a:t>
+            </a:r>
+            <a:r>
+              <a:rPr lang="ko-KR" altLang="en-US" smtClean="0"/>
+              <a:t>쌍방향 연결은 </a:t>
+            </a:r>
+            <a:r>
+              <a:rPr lang="en-US" altLang="ko-KR" smtClean="0"/>
+              <a:t>GRPC Stream</a:t>
+            </a:r>
+            <a:r>
+              <a:rPr lang="ko-KR" altLang="en-US" smtClean="0"/>
+              <a:t>으로 할 예정이다</a:t>
+            </a:r>
+            <a:r>
+              <a:rPr lang="en-US" altLang="ko-KR" smtClean="0"/>
+              <a:t>. </a:t>
+            </a:r>
+            <a:r>
+              <a:rPr lang="ko-KR" altLang="en-US" smtClean="0"/>
+              <a:t>통신할 때의 데이터 직렬화는 </a:t>
+            </a:r>
+            <a:r>
+              <a:rPr lang="en-US" altLang="ko-KR" smtClean="0"/>
+              <a:t>Protobuf</a:t>
+            </a:r>
+            <a:r>
+              <a:rPr lang="ko-KR" altLang="en-US" smtClean="0"/>
+              <a:t>를 활용한다</a:t>
+            </a:r>
+            <a:r>
+              <a:rPr lang="en-US" altLang="ko-KR" smtClean="0"/>
+              <a:t>.</a:t>
+            </a:r>
+          </a:p>
+          <a:p>
+            <a:r>
+              <a:rPr lang="en-US" altLang="ko-KR" smtClean="0"/>
+              <a:t>=&gt; </a:t>
+            </a:r>
+            <a:r>
+              <a:rPr lang="ko-KR" altLang="en-US" smtClean="0"/>
+              <a:t>의존하는 라이브러리의 개수를 줄이기 위함</a:t>
+            </a:r>
+            <a:endParaRPr lang="en-US" altLang="ko-KR" smtClean="0"/>
+          </a:p>
+        </p:txBody>
+      </p:sp>
+    </p:spTree>
+    <p:extLst>
+      <p:ext uri="{BB962C8B-B14F-4D97-AF65-F5344CB8AC3E}">
+        <p14:creationId xmlns:p14="http://schemas.microsoft.com/office/powerpoint/2010/main" val="2145348254"/>
+      </p:ext>
+    </p:extLst>
+  </p:cSld>
+  <p:clrMapOvr>
+    <a:masterClrMapping/>
+  </p:clrMapOvr>
+  <p:timing>
+    <p:tnLst>
+      <p:par>
+        <p:cTn id="1" dur="indefinite" restart="never" nodeType="tmRoot"/>
+      </p:par>
+    </p:tnLst>
+  </p:timing>
+</p:sld>
+</file>
+
+<file path=ppt/slides/slide4.xml><?xml version="1.0" encoding="utf-8"?>
+<p:sld xmlns:a="http://schemas.openxmlformats.org/drawingml/2006/main" xmlns:r="http://schemas.openxmlformats.org/officeDocument/2006/relationships" xmlns:p="http://schemas.openxmlformats.org/presentationml/2006/main">
+  <p:cSld>
+    <p:spTree>
+      <p:nvGrpSpPr>
+        <p:cNvPr id="1" name=""/>
+        <p:cNvGrpSpPr/>
+        <p:nvPr/>
+      </p:nvGrpSpPr>
+      <p:grpSpPr>
+        <a:xfrm>
+          <a:off x="0" y="0"/>
+          <a:ext cx="0" cy="0"/>
+          <a:chOff x="0" y="0"/>
+          <a:chExt cx="0" cy="0"/>
+        </a:xfrm>
+      </p:grpSpPr>
+      <p:sp>
+        <p:nvSpPr>
           <p:cNvPr id="5" name="TextBox 4"/>
           <p:cNvSpPr txBox="1"/>
           <p:nvPr/>
@@ -3340,6 +3644,2166 @@
     <p:extLst>
       <p:ext uri="{BB962C8B-B14F-4D97-AF65-F5344CB8AC3E}">
         <p14:creationId xmlns:p14="http://schemas.microsoft.com/office/powerpoint/2010/main" val="491864020"/>
+      </p:ext>
+    </p:extLst>
+  </p:cSld>
+  <p:clrMapOvr>
+    <a:masterClrMapping/>
+  </p:clrMapOvr>
+  <p:timing>
+    <p:tnLst>
+      <p:par>
+        <p:cTn id="1" dur="indefinite" restart="never" nodeType="tmRoot"/>
+      </p:par>
+    </p:tnLst>
+  </p:timing>
+</p:sld>
+</file>
+
+<file path=ppt/slides/slide5.xml><?xml version="1.0" encoding="utf-8"?>
+<p:sld xmlns:a="http://schemas.openxmlformats.org/drawingml/2006/main" xmlns:r="http://schemas.openxmlformats.org/officeDocument/2006/relationships" xmlns:p="http://schemas.openxmlformats.org/presentationml/2006/main">
+  <p:cSld>
+    <p:spTree>
+      <p:nvGrpSpPr>
+        <p:cNvPr id="1" name=""/>
+        <p:cNvGrpSpPr/>
+        <p:nvPr/>
+      </p:nvGrpSpPr>
+      <p:grpSpPr>
+        <a:xfrm>
+          <a:off x="0" y="0"/>
+          <a:ext cx="0" cy="0"/>
+          <a:chOff x="0" y="0"/>
+          <a:chExt cx="0" cy="0"/>
+        </a:xfrm>
+      </p:grpSpPr>
+      <p:sp>
+        <p:nvSpPr>
+          <p:cNvPr id="2" name="직사각형 1"/>
+          <p:cNvSpPr/>
+          <p:nvPr/>
+        </p:nvSpPr>
+        <p:spPr>
+          <a:xfrm>
+            <a:off x="638256" y="2902021"/>
+            <a:ext cx="7127272" cy="707886"/>
+          </a:xfrm>
+          <a:prstGeom prst="rect">
+            <a:avLst/>
+          </a:prstGeom>
+          <a:noFill/>
+        </p:spPr>
+        <p:txBody>
+          <a:bodyPr wrap="none" lIns="91440" tIns="45720" rIns="91440" bIns="45720">
+            <a:spAutoFit/>
+          </a:bodyPr>
+          <a:lstStyle/>
+          <a:p>
+            <a:pPr algn="ctr"/>
+            <a:r>
+              <a:rPr lang="en-US" altLang="ko-KR" sz="4000" smtClean="0">
+                <a:ln w="0"/>
+                <a:effectLst>
+                  <a:outerShdw blurRad="38100" dist="19050" dir="2700000" algn="tl" rotWithShape="0">
+                    <a:schemeClr val="dk1">
+                      <a:alpha val="40000"/>
+                    </a:schemeClr>
+                  </a:outerShdw>
+                </a:effectLst>
+              </a:rPr>
+              <a:t>2. </a:t>
+            </a:r>
+            <a:r>
+              <a:rPr lang="ko-KR" altLang="en-US" sz="4000" smtClean="0">
+                <a:ln w="0"/>
+                <a:effectLst>
+                  <a:outerShdw blurRad="38100" dist="19050" dir="2700000" algn="tl" rotWithShape="0">
+                    <a:schemeClr val="dk1">
+                      <a:alpha val="40000"/>
+                    </a:schemeClr>
+                  </a:outerShdw>
+                </a:effectLst>
+              </a:rPr>
+              <a:t>노예 노드의 담당 범위 할당</a:t>
+            </a:r>
+            <a:endParaRPr lang="en-US" altLang="ko-KR" sz="4000" b="0" cap="none" spc="0">
+              <a:ln w="0"/>
+              <a:solidFill>
+                <a:schemeClr val="tx1"/>
+              </a:solidFill>
+              <a:effectLst>
+                <a:outerShdw blurRad="38100" dist="19050" dir="2700000" algn="tl" rotWithShape="0">
+                  <a:schemeClr val="dk1">
+                    <a:alpha val="40000"/>
+                  </a:schemeClr>
+                </a:outerShdw>
+              </a:effectLst>
+            </a:endParaRPr>
+          </a:p>
+        </p:txBody>
+      </p:sp>
+    </p:spTree>
+    <p:extLst>
+      <p:ext uri="{BB962C8B-B14F-4D97-AF65-F5344CB8AC3E}">
+        <p14:creationId xmlns:p14="http://schemas.microsoft.com/office/powerpoint/2010/main" val="3048451757"/>
+      </p:ext>
+    </p:extLst>
+  </p:cSld>
+  <p:clrMapOvr>
+    <a:masterClrMapping/>
+  </p:clrMapOvr>
+  <p:timing>
+    <p:tnLst>
+      <p:par>
+        <p:cTn id="1" dur="indefinite" restart="never" nodeType="tmRoot"/>
+      </p:par>
+    </p:tnLst>
+  </p:timing>
+</p:sld>
+</file>
+
+<file path=ppt/slides/slide6.xml><?xml version="1.0" encoding="utf-8"?>
+<p:sld xmlns:a="http://schemas.openxmlformats.org/drawingml/2006/main" xmlns:r="http://schemas.openxmlformats.org/officeDocument/2006/relationships" xmlns:p="http://schemas.openxmlformats.org/presentationml/2006/main">
+  <p:cSld>
+    <p:spTree>
+      <p:nvGrpSpPr>
+        <p:cNvPr id="1" name=""/>
+        <p:cNvGrpSpPr/>
+        <p:nvPr/>
+      </p:nvGrpSpPr>
+      <p:grpSpPr>
+        <a:xfrm>
+          <a:off x="0" y="0"/>
+          <a:ext cx="0" cy="0"/>
+          <a:chOff x="0" y="0"/>
+          <a:chExt cx="0" cy="0"/>
+        </a:xfrm>
+      </p:grpSpPr>
+      <p:sp>
+        <p:nvSpPr>
+          <p:cNvPr id="5" name="TextBox 4"/>
+          <p:cNvSpPr txBox="1"/>
+          <p:nvPr/>
+        </p:nvSpPr>
+        <p:spPr>
+          <a:xfrm>
+            <a:off x="326571" y="285750"/>
+            <a:ext cx="6996793" cy="369332"/>
+          </a:xfrm>
+          <a:prstGeom prst="rect">
+            <a:avLst/>
+          </a:prstGeom>
+          <a:noFill/>
+        </p:spPr>
+        <p:txBody>
+          <a:bodyPr wrap="square" rtlCol="0">
+            <a:spAutoFit/>
+          </a:bodyPr>
+          <a:lstStyle/>
+          <a:p>
+            <a:r>
+              <a:rPr lang="ko-KR" altLang="en-US" smtClean="0"/>
+              <a:t>주인 노드에서 각 노예노드에게 범위 할당</a:t>
+            </a:r>
+            <a:endParaRPr lang="ko-KR" altLang="en-US"/>
+          </a:p>
+        </p:txBody>
+      </p:sp>
+      <p:sp>
+        <p:nvSpPr>
+          <p:cNvPr id="6" name="모서리가 둥근 직사각형 5"/>
+          <p:cNvSpPr/>
+          <p:nvPr/>
+        </p:nvSpPr>
+        <p:spPr>
+          <a:xfrm>
+            <a:off x="2979964" y="800101"/>
+            <a:ext cx="2579915" cy="457200"/>
+          </a:xfrm>
+          <a:prstGeom prst="roundRect">
+            <a:avLst/>
+          </a:prstGeom>
+          <a:solidFill>
+            <a:schemeClr val="accent2">
+              <a:lumMod val="40000"/>
+              <a:lumOff val="60000"/>
+            </a:schemeClr>
+          </a:solidFill>
+          <a:ln>
+            <a:solidFill>
+              <a:schemeClr val="accent2">
+                <a:lumMod val="75000"/>
+              </a:schemeClr>
+            </a:solidFill>
+          </a:ln>
+        </p:spPr>
+        <p:style>
+          <a:lnRef idx="2">
+            <a:schemeClr val="accent1">
+              <a:shade val="50000"/>
+            </a:schemeClr>
+          </a:lnRef>
+          <a:fillRef idx="1">
+            <a:schemeClr val="accent1"/>
+          </a:fillRef>
+          <a:effectRef idx="0">
+            <a:schemeClr val="accent1"/>
+          </a:effectRef>
+          <a:fontRef idx="minor">
+            <a:schemeClr val="lt1"/>
+          </a:fontRef>
+        </p:style>
+        <p:txBody>
+          <a:bodyPr rtlCol="0" anchor="ctr"/>
+          <a:lstStyle/>
+          <a:p>
+            <a:pPr algn="ctr"/>
+            <a:r>
+              <a:rPr lang="ko-KR" altLang="en-US" smtClean="0">
+                <a:solidFill>
+                  <a:schemeClr val="tx1"/>
+                </a:solidFill>
+              </a:rPr>
+              <a:t>주인 노드</a:t>
+            </a:r>
+            <a:endParaRPr lang="ko-KR" altLang="en-US">
+              <a:solidFill>
+                <a:schemeClr val="tx1"/>
+              </a:solidFill>
+            </a:endParaRPr>
+          </a:p>
+        </p:txBody>
+      </p:sp>
+      <p:sp>
+        <p:nvSpPr>
+          <p:cNvPr id="7" name="모서리가 둥근 직사각형 6"/>
+          <p:cNvSpPr/>
+          <p:nvPr/>
+        </p:nvSpPr>
+        <p:spPr>
+          <a:xfrm>
+            <a:off x="552451" y="2618015"/>
+            <a:ext cx="1741714" cy="457200"/>
+          </a:xfrm>
+          <a:prstGeom prst="roundRect">
+            <a:avLst/>
+          </a:prstGeom>
+          <a:solidFill>
+            <a:schemeClr val="accent1">
+              <a:lumMod val="40000"/>
+              <a:lumOff val="60000"/>
+            </a:schemeClr>
+          </a:solidFill>
+          <a:ln>
+            <a:solidFill>
+              <a:schemeClr val="accent1">
+                <a:lumMod val="75000"/>
+              </a:schemeClr>
+            </a:solidFill>
+          </a:ln>
+        </p:spPr>
+        <p:style>
+          <a:lnRef idx="2">
+            <a:schemeClr val="accent1">
+              <a:shade val="50000"/>
+            </a:schemeClr>
+          </a:lnRef>
+          <a:fillRef idx="1">
+            <a:schemeClr val="accent1"/>
+          </a:fillRef>
+          <a:effectRef idx="0">
+            <a:schemeClr val="accent1"/>
+          </a:effectRef>
+          <a:fontRef idx="minor">
+            <a:schemeClr val="lt1"/>
+          </a:fontRef>
+        </p:style>
+        <p:txBody>
+          <a:bodyPr rtlCol="0" anchor="ctr"/>
+          <a:lstStyle/>
+          <a:p>
+            <a:pPr algn="ctr"/>
+            <a:r>
+              <a:rPr lang="ko-KR" altLang="en-US" smtClean="0">
+                <a:solidFill>
+                  <a:schemeClr val="tx1"/>
+                </a:solidFill>
+              </a:rPr>
+              <a:t>노예 노드 </a:t>
+            </a:r>
+            <a:r>
+              <a:rPr lang="en-US" altLang="ko-KR" smtClean="0">
+                <a:solidFill>
+                  <a:schemeClr val="tx1"/>
+                </a:solidFill>
+              </a:rPr>
+              <a:t>1</a:t>
+            </a:r>
+            <a:endParaRPr lang="ko-KR" altLang="en-US">
+              <a:solidFill>
+                <a:schemeClr val="tx1"/>
+              </a:solidFill>
+            </a:endParaRPr>
+          </a:p>
+        </p:txBody>
+      </p:sp>
+      <p:cxnSp>
+        <p:nvCxnSpPr>
+          <p:cNvPr id="9" name="직선 화살표 연결선 8"/>
+          <p:cNvCxnSpPr>
+            <a:stCxn id="7" idx="0"/>
+            <a:endCxn id="6" idx="2"/>
+          </p:cNvCxnSpPr>
+          <p:nvPr/>
+        </p:nvCxnSpPr>
+        <p:spPr>
+          <a:xfrm flipV="1">
+            <a:off x="1423308" y="1257301"/>
+            <a:ext cx="2846614" cy="1360714"/>
+          </a:xfrm>
+          <a:prstGeom prst="straightConnector1">
+            <a:avLst/>
+          </a:prstGeom>
+          <a:ln>
+            <a:tailEnd type="triangle"/>
+          </a:ln>
+        </p:spPr>
+        <p:style>
+          <a:lnRef idx="1">
+            <a:schemeClr val="accent1"/>
+          </a:lnRef>
+          <a:fillRef idx="0">
+            <a:schemeClr val="accent1"/>
+          </a:fillRef>
+          <a:effectRef idx="0">
+            <a:schemeClr val="accent1"/>
+          </a:effectRef>
+          <a:fontRef idx="minor">
+            <a:schemeClr val="tx1"/>
+          </a:fontRef>
+        </p:style>
+      </p:cxnSp>
+      <p:sp>
+        <p:nvSpPr>
+          <p:cNvPr id="11" name="모서리가 둥근 직사각형 10"/>
+          <p:cNvSpPr/>
+          <p:nvPr/>
+        </p:nvSpPr>
+        <p:spPr>
+          <a:xfrm>
+            <a:off x="2528207" y="2618015"/>
+            <a:ext cx="1741714" cy="457200"/>
+          </a:xfrm>
+          <a:prstGeom prst="roundRect">
+            <a:avLst/>
+          </a:prstGeom>
+          <a:solidFill>
+            <a:schemeClr val="accent1">
+              <a:lumMod val="40000"/>
+              <a:lumOff val="60000"/>
+            </a:schemeClr>
+          </a:solidFill>
+          <a:ln>
+            <a:solidFill>
+              <a:schemeClr val="accent1">
+                <a:lumMod val="75000"/>
+              </a:schemeClr>
+            </a:solidFill>
+          </a:ln>
+        </p:spPr>
+        <p:style>
+          <a:lnRef idx="2">
+            <a:schemeClr val="accent1">
+              <a:shade val="50000"/>
+            </a:schemeClr>
+          </a:lnRef>
+          <a:fillRef idx="1">
+            <a:schemeClr val="accent1"/>
+          </a:fillRef>
+          <a:effectRef idx="0">
+            <a:schemeClr val="accent1"/>
+          </a:effectRef>
+          <a:fontRef idx="minor">
+            <a:schemeClr val="lt1"/>
+          </a:fontRef>
+        </p:style>
+        <p:txBody>
+          <a:bodyPr rtlCol="0" anchor="ctr"/>
+          <a:lstStyle/>
+          <a:p>
+            <a:pPr algn="ctr"/>
+            <a:r>
+              <a:rPr lang="ko-KR" altLang="en-US" smtClean="0">
+                <a:solidFill>
+                  <a:schemeClr val="tx1"/>
+                </a:solidFill>
+              </a:rPr>
+              <a:t>노예 노드 </a:t>
+            </a:r>
+            <a:r>
+              <a:rPr lang="en-US" altLang="ko-KR">
+                <a:solidFill>
+                  <a:schemeClr val="tx1"/>
+                </a:solidFill>
+              </a:rPr>
+              <a:t>2</a:t>
+            </a:r>
+            <a:endParaRPr lang="ko-KR" altLang="en-US">
+              <a:solidFill>
+                <a:schemeClr val="tx1"/>
+              </a:solidFill>
+            </a:endParaRPr>
+          </a:p>
+        </p:txBody>
+      </p:sp>
+      <p:cxnSp>
+        <p:nvCxnSpPr>
+          <p:cNvPr id="13" name="직선 화살표 연결선 12"/>
+          <p:cNvCxnSpPr>
+            <a:stCxn id="11" idx="0"/>
+          </p:cNvCxnSpPr>
+          <p:nvPr/>
+        </p:nvCxnSpPr>
+        <p:spPr>
+          <a:xfrm flipV="1">
+            <a:off x="3399064" y="1257301"/>
+            <a:ext cx="870857" cy="1360714"/>
+          </a:xfrm>
+          <a:prstGeom prst="straightConnector1">
+            <a:avLst/>
+          </a:prstGeom>
+          <a:ln>
+            <a:tailEnd type="triangle"/>
+          </a:ln>
+        </p:spPr>
+        <p:style>
+          <a:lnRef idx="1">
+            <a:schemeClr val="accent1"/>
+          </a:lnRef>
+          <a:fillRef idx="0">
+            <a:schemeClr val="accent1"/>
+          </a:fillRef>
+          <a:effectRef idx="0">
+            <a:schemeClr val="accent1"/>
+          </a:effectRef>
+          <a:fontRef idx="minor">
+            <a:schemeClr val="tx1"/>
+          </a:fontRef>
+        </p:style>
+      </p:cxnSp>
+      <p:sp>
+        <p:nvSpPr>
+          <p:cNvPr id="14" name="모서리가 둥근 직사각형 13"/>
+          <p:cNvSpPr/>
+          <p:nvPr/>
+        </p:nvSpPr>
+        <p:spPr>
+          <a:xfrm>
+            <a:off x="6539591" y="2618015"/>
+            <a:ext cx="1741714" cy="457200"/>
+          </a:xfrm>
+          <a:prstGeom prst="roundRect">
+            <a:avLst/>
+          </a:prstGeom>
+          <a:solidFill>
+            <a:schemeClr val="accent1">
+              <a:lumMod val="40000"/>
+              <a:lumOff val="60000"/>
+            </a:schemeClr>
+          </a:solidFill>
+          <a:ln>
+            <a:solidFill>
+              <a:schemeClr val="accent1">
+                <a:lumMod val="75000"/>
+              </a:schemeClr>
+            </a:solidFill>
+          </a:ln>
+        </p:spPr>
+        <p:style>
+          <a:lnRef idx="2">
+            <a:schemeClr val="accent1">
+              <a:shade val="50000"/>
+            </a:schemeClr>
+          </a:lnRef>
+          <a:fillRef idx="1">
+            <a:schemeClr val="accent1"/>
+          </a:fillRef>
+          <a:effectRef idx="0">
+            <a:schemeClr val="accent1"/>
+          </a:effectRef>
+          <a:fontRef idx="minor">
+            <a:schemeClr val="lt1"/>
+          </a:fontRef>
+        </p:style>
+        <p:txBody>
+          <a:bodyPr rtlCol="0" anchor="ctr"/>
+          <a:lstStyle/>
+          <a:p>
+            <a:pPr algn="ctr"/>
+            <a:r>
+              <a:rPr lang="ko-KR" altLang="en-US" smtClean="0">
+                <a:solidFill>
+                  <a:schemeClr val="tx1"/>
+                </a:solidFill>
+              </a:rPr>
+              <a:t>노예 노드 </a:t>
+            </a:r>
+            <a:r>
+              <a:rPr lang="en-US" altLang="ko-KR" smtClean="0">
+                <a:solidFill>
+                  <a:schemeClr val="tx1"/>
+                </a:solidFill>
+              </a:rPr>
+              <a:t>N</a:t>
+            </a:r>
+            <a:endParaRPr lang="ko-KR" altLang="en-US">
+              <a:solidFill>
+                <a:schemeClr val="tx1"/>
+              </a:solidFill>
+            </a:endParaRPr>
+          </a:p>
+        </p:txBody>
+      </p:sp>
+      <p:cxnSp>
+        <p:nvCxnSpPr>
+          <p:cNvPr id="18" name="직선 화살표 연결선 17"/>
+          <p:cNvCxnSpPr>
+            <a:stCxn id="14" idx="0"/>
+            <a:endCxn id="6" idx="2"/>
+          </p:cNvCxnSpPr>
+          <p:nvPr/>
+        </p:nvCxnSpPr>
+        <p:spPr>
+          <a:xfrm flipH="1" flipV="1">
+            <a:off x="4269922" y="1257301"/>
+            <a:ext cx="3140526" cy="1360714"/>
+          </a:xfrm>
+          <a:prstGeom prst="straightConnector1">
+            <a:avLst/>
+          </a:prstGeom>
+          <a:ln>
+            <a:tailEnd type="triangle"/>
+          </a:ln>
+        </p:spPr>
+        <p:style>
+          <a:lnRef idx="1">
+            <a:schemeClr val="accent1"/>
+          </a:lnRef>
+          <a:fillRef idx="0">
+            <a:schemeClr val="accent1"/>
+          </a:fillRef>
+          <a:effectRef idx="0">
+            <a:schemeClr val="accent1"/>
+          </a:effectRef>
+          <a:fontRef idx="minor">
+            <a:schemeClr val="tx1"/>
+          </a:fontRef>
+        </p:style>
+      </p:cxnSp>
+      <p:sp>
+        <p:nvSpPr>
+          <p:cNvPr id="20" name="모서리가 둥근 직사각형 19"/>
+          <p:cNvSpPr/>
+          <p:nvPr/>
+        </p:nvSpPr>
+        <p:spPr>
+          <a:xfrm>
+            <a:off x="4503963" y="2618015"/>
+            <a:ext cx="1741714" cy="457200"/>
+          </a:xfrm>
+          <a:prstGeom prst="roundRect">
+            <a:avLst/>
+          </a:prstGeom>
+          <a:solidFill>
+            <a:schemeClr val="accent1">
+              <a:lumMod val="40000"/>
+              <a:lumOff val="60000"/>
+            </a:schemeClr>
+          </a:solidFill>
+          <a:ln>
+            <a:solidFill>
+              <a:schemeClr val="accent1">
+                <a:lumMod val="75000"/>
+              </a:schemeClr>
+            </a:solidFill>
+          </a:ln>
+        </p:spPr>
+        <p:style>
+          <a:lnRef idx="2">
+            <a:schemeClr val="accent1">
+              <a:shade val="50000"/>
+            </a:schemeClr>
+          </a:lnRef>
+          <a:fillRef idx="1">
+            <a:schemeClr val="accent1"/>
+          </a:fillRef>
+          <a:effectRef idx="0">
+            <a:schemeClr val="accent1"/>
+          </a:effectRef>
+          <a:fontRef idx="minor">
+            <a:schemeClr val="lt1"/>
+          </a:fontRef>
+        </p:style>
+        <p:txBody>
+          <a:bodyPr rtlCol="0" anchor="ctr"/>
+          <a:lstStyle/>
+          <a:p>
+            <a:pPr algn="ctr"/>
+            <a:r>
+              <a:rPr lang="en-US" altLang="ko-KR" smtClean="0">
+                <a:solidFill>
+                  <a:schemeClr val="tx1"/>
+                </a:solidFill>
+              </a:rPr>
+              <a:t>……</a:t>
+            </a:r>
+            <a:endParaRPr lang="ko-KR" altLang="en-US">
+              <a:solidFill>
+                <a:schemeClr val="tx1"/>
+              </a:solidFill>
+            </a:endParaRPr>
+          </a:p>
+        </p:txBody>
+      </p:sp>
+      <p:cxnSp>
+        <p:nvCxnSpPr>
+          <p:cNvPr id="23" name="직선 화살표 연결선 22"/>
+          <p:cNvCxnSpPr>
+            <a:stCxn id="20" idx="0"/>
+            <a:endCxn id="6" idx="2"/>
+          </p:cNvCxnSpPr>
+          <p:nvPr/>
+        </p:nvCxnSpPr>
+        <p:spPr>
+          <a:xfrm flipH="1" flipV="1">
+            <a:off x="4269922" y="1257301"/>
+            <a:ext cx="1104898" cy="1360714"/>
+          </a:xfrm>
+          <a:prstGeom prst="straightConnector1">
+            <a:avLst/>
+          </a:prstGeom>
+          <a:ln>
+            <a:tailEnd type="triangle"/>
+          </a:ln>
+        </p:spPr>
+        <p:style>
+          <a:lnRef idx="1">
+            <a:schemeClr val="accent1"/>
+          </a:lnRef>
+          <a:fillRef idx="0">
+            <a:schemeClr val="accent1"/>
+          </a:fillRef>
+          <a:effectRef idx="0">
+            <a:schemeClr val="accent1"/>
+          </a:effectRef>
+          <a:fontRef idx="minor">
+            <a:schemeClr val="tx1"/>
+          </a:fontRef>
+        </p:style>
+      </p:cxnSp>
+      <p:sp>
+        <p:nvSpPr>
+          <p:cNvPr id="25" name="대각선 방향의 모서리가 잘린 사각형 24"/>
+          <p:cNvSpPr/>
+          <p:nvPr/>
+        </p:nvSpPr>
+        <p:spPr>
+          <a:xfrm>
+            <a:off x="2062842" y="1979541"/>
+            <a:ext cx="590552" cy="224910"/>
+          </a:xfrm>
+          <a:prstGeom prst="snip2DiagRect">
+            <a:avLst/>
+          </a:prstGeom>
+        </p:spPr>
+        <p:style>
+          <a:lnRef idx="2">
+            <a:schemeClr val="accent6">
+              <a:shade val="50000"/>
+            </a:schemeClr>
+          </a:lnRef>
+          <a:fillRef idx="1">
+            <a:schemeClr val="accent6"/>
+          </a:fillRef>
+          <a:effectRef idx="0">
+            <a:schemeClr val="accent6"/>
+          </a:effectRef>
+          <a:fontRef idx="minor">
+            <a:schemeClr val="lt1"/>
+          </a:fontRef>
+        </p:style>
+        <p:txBody>
+          <a:bodyPr rtlCol="0" anchor="ctr"/>
+          <a:lstStyle/>
+          <a:p>
+            <a:pPr algn="ctr"/>
+            <a:r>
+              <a:rPr lang="ko-KR" altLang="en-US" sz="1200" smtClean="0"/>
+              <a:t>키</a:t>
+            </a:r>
+            <a:r>
+              <a:rPr lang="en-US" altLang="ko-KR" sz="1200" smtClean="0"/>
+              <a:t>1</a:t>
+            </a:r>
+            <a:endParaRPr lang="ko-KR" altLang="en-US" sz="1200"/>
+          </a:p>
+        </p:txBody>
+      </p:sp>
+      <p:sp>
+        <p:nvSpPr>
+          <p:cNvPr id="26" name="TextBox 25"/>
+          <p:cNvSpPr txBox="1"/>
+          <p:nvPr/>
+        </p:nvSpPr>
+        <p:spPr>
+          <a:xfrm>
+            <a:off x="336095" y="3577131"/>
+            <a:ext cx="10448926" cy="2585323"/>
+          </a:xfrm>
+          <a:prstGeom prst="rect">
+            <a:avLst/>
+          </a:prstGeom>
+          <a:noFill/>
+        </p:spPr>
+        <p:txBody>
+          <a:bodyPr wrap="square" rtlCol="0">
+            <a:spAutoFit/>
+          </a:bodyPr>
+          <a:lstStyle/>
+          <a:p>
+            <a:pPr marL="342900" indent="-342900">
+              <a:buAutoNum type="arabicPeriod"/>
+            </a:pPr>
+            <a:r>
+              <a:rPr lang="ko-KR" altLang="en-US" smtClean="0"/>
+              <a:t>각 노예노드는 주인 노드에게 샘플링 키 </a:t>
+            </a:r>
+            <a:r>
+              <a:rPr lang="en-US" altLang="ko-KR" smtClean="0"/>
+              <a:t>1</a:t>
+            </a:r>
+            <a:r>
+              <a:rPr lang="ko-KR" altLang="en-US" smtClean="0"/>
+              <a:t>개를 제출 </a:t>
+            </a:r>
+            <a:r>
+              <a:rPr lang="en-US" altLang="ko-KR" smtClean="0"/>
+              <a:t>(</a:t>
+            </a:r>
+            <a:r>
+              <a:rPr lang="ko-KR" altLang="en-US" smtClean="0"/>
+              <a:t>가장 간단한 모델</a:t>
+            </a:r>
+            <a:r>
+              <a:rPr lang="en-US" altLang="ko-KR" smtClean="0"/>
+              <a:t>)</a:t>
+            </a:r>
+            <a:endParaRPr lang="en-US" altLang="ko-KR"/>
+          </a:p>
+          <a:p>
+            <a:pPr marL="342900" indent="-342900">
+              <a:buAutoNum type="arabicPeriod"/>
+            </a:pPr>
+            <a:r>
+              <a:rPr lang="ko-KR" altLang="en-US" smtClean="0"/>
+              <a:t>주인 노드가 </a:t>
+            </a:r>
+            <a:r>
+              <a:rPr lang="en-US" altLang="ko-KR" smtClean="0"/>
+              <a:t>N</a:t>
+            </a:r>
+            <a:r>
+              <a:rPr lang="ko-KR" altLang="en-US" smtClean="0"/>
+              <a:t>개의 키를 각 노드에게서 받으면 키 리스트를 정렬</a:t>
+            </a:r>
+            <a:endParaRPr lang="en-US" altLang="ko-KR" smtClean="0"/>
+          </a:p>
+          <a:p>
+            <a:pPr marL="342900" indent="-342900">
+              <a:buAutoNum type="arabicPeriod"/>
+            </a:pPr>
+            <a:r>
+              <a:rPr lang="ko-KR" altLang="en-US" strike="sngStrike" smtClean="0"/>
+              <a:t>노예 노드의 순서는 연결이 빨리 된 순서로 할당한다</a:t>
+            </a:r>
+            <a:endParaRPr lang="en-US" altLang="ko-KR" strike="sngStrike" smtClean="0"/>
+          </a:p>
+          <a:p>
+            <a:pPr marL="342900" indent="-342900">
+              <a:buAutoNum type="arabicPeriod"/>
+            </a:pPr>
+            <a:r>
+              <a:rPr lang="ko-KR" altLang="en-US" smtClean="0"/>
+              <a:t>노예 노드의 순서는 키 정렬의 순서와 일치 시킨다</a:t>
+            </a:r>
+            <a:endParaRPr lang="en-US" altLang="ko-KR" smtClean="0"/>
+          </a:p>
+          <a:p>
+            <a:pPr marL="342900" indent="-342900">
+              <a:buAutoNum type="arabicPeriod"/>
+            </a:pPr>
+            <a:r>
+              <a:rPr lang="ko-KR" altLang="en-US" smtClean="0"/>
+              <a:t>각각의 노예 노드 </a:t>
+            </a:r>
+            <a:r>
+              <a:rPr lang="en-US" altLang="ko-KR" smtClean="0"/>
+              <a:t>i</a:t>
+            </a:r>
+            <a:r>
+              <a:rPr lang="ko-KR" altLang="en-US" smtClean="0"/>
+              <a:t>는 키가 반열린구간 </a:t>
+            </a:r>
+            <a:r>
+              <a:rPr lang="en-US" altLang="ko-KR"/>
+              <a:t>[</a:t>
+            </a:r>
+            <a:r>
+              <a:rPr lang="ko-KR" altLang="en-US" smtClean="0"/>
+              <a:t>키리스트</a:t>
+            </a:r>
+            <a:r>
+              <a:rPr lang="en-US" altLang="ko-KR" smtClean="0"/>
+              <a:t>[i – 1], </a:t>
+            </a:r>
+            <a:r>
+              <a:rPr lang="ko-KR" altLang="en-US" smtClean="0"/>
+              <a:t>키 리스트</a:t>
+            </a:r>
+            <a:r>
+              <a:rPr lang="en-US" altLang="ko-KR" smtClean="0"/>
+              <a:t>[i]) </a:t>
+            </a:r>
+            <a:r>
+              <a:rPr lang="ko-KR" altLang="en-US" smtClean="0"/>
+              <a:t>에 속하는 데이터들을 담당한다</a:t>
+            </a:r>
+            <a:r>
+              <a:rPr lang="en-US" altLang="ko-KR" smtClean="0"/>
+              <a:t>.</a:t>
+            </a:r>
+          </a:p>
+          <a:p>
+            <a:pPr marL="342900" indent="-342900">
+              <a:buAutoNum type="arabicPeriod"/>
+            </a:pPr>
+            <a:r>
+              <a:rPr lang="ko-KR" altLang="en-US" smtClean="0"/>
+              <a:t>각각의 노드에게 할당된 범위를 응답으로 준다</a:t>
+            </a:r>
+            <a:r>
+              <a:rPr lang="en-US" altLang="ko-KR" smtClean="0"/>
+              <a:t>.</a:t>
+            </a:r>
+          </a:p>
+          <a:p>
+            <a:pPr marL="342900" indent="-342900">
+              <a:buAutoNum type="arabicPeriod"/>
+            </a:pPr>
+            <a:r>
+              <a:rPr lang="ko-KR" altLang="en-US" smtClean="0"/>
+              <a:t>이런 구간 나누기 방법은 노예노드 </a:t>
+            </a:r>
+            <a:r>
+              <a:rPr lang="en-US" altLang="ko-KR" smtClean="0"/>
+              <a:t>i – 1</a:t>
+            </a:r>
+            <a:r>
+              <a:rPr lang="ko-KR" altLang="en-US" smtClean="0"/>
+              <a:t>의 모든 키값은 노예노드 </a:t>
+            </a:r>
+            <a:r>
+              <a:rPr lang="en-US" altLang="ko-KR" smtClean="0"/>
+              <a:t>i </a:t>
+            </a:r>
+            <a:r>
+              <a:rPr lang="ko-KR" altLang="en-US" smtClean="0"/>
+              <a:t>의 모든 키 값보다 작다는 특성을 만족한다</a:t>
+            </a:r>
+            <a:r>
+              <a:rPr lang="en-US" altLang="ko-KR" smtClean="0"/>
+              <a:t>.</a:t>
+            </a:r>
+            <a:endParaRPr lang="en-US" altLang="ko-KR"/>
+          </a:p>
+        </p:txBody>
+      </p:sp>
+      <p:grpSp>
+        <p:nvGrpSpPr>
+          <p:cNvPr id="36" name="그룹 35"/>
+          <p:cNvGrpSpPr/>
+          <p:nvPr/>
+        </p:nvGrpSpPr>
+        <p:grpSpPr>
+          <a:xfrm>
+            <a:off x="6006191" y="646779"/>
+            <a:ext cx="2612572" cy="716799"/>
+            <a:chOff x="6245677" y="429885"/>
+            <a:chExt cx="2612572" cy="716799"/>
+          </a:xfrm>
+        </p:grpSpPr>
+        <p:grpSp>
+          <p:nvGrpSpPr>
+            <p:cNvPr id="35" name="그룹 34"/>
+            <p:cNvGrpSpPr/>
+            <p:nvPr/>
+          </p:nvGrpSpPr>
+          <p:grpSpPr>
+            <a:xfrm>
+              <a:off x="6245677" y="825851"/>
+              <a:ext cx="2612572" cy="320833"/>
+              <a:chOff x="6245677" y="825851"/>
+              <a:chExt cx="2612572" cy="320833"/>
+            </a:xfrm>
+          </p:grpSpPr>
+          <p:sp>
+            <p:nvSpPr>
+              <p:cNvPr id="30" name="대각선 방향의 모서리가 잘린 사각형 29"/>
+              <p:cNvSpPr/>
+              <p:nvPr/>
+            </p:nvSpPr>
+            <p:spPr>
+              <a:xfrm>
+                <a:off x="6898820" y="829059"/>
+                <a:ext cx="653143" cy="317625"/>
+              </a:xfrm>
+              <a:prstGeom prst="snip2DiagRect">
+                <a:avLst/>
+              </a:prstGeom>
+            </p:spPr>
+            <p:style>
+              <a:lnRef idx="2">
+                <a:schemeClr val="accent6">
+                  <a:shade val="50000"/>
+                </a:schemeClr>
+              </a:lnRef>
+              <a:fillRef idx="1">
+                <a:schemeClr val="accent6"/>
+              </a:fillRef>
+              <a:effectRef idx="0">
+                <a:schemeClr val="accent6"/>
+              </a:effectRef>
+              <a:fontRef idx="minor">
+                <a:schemeClr val="lt1"/>
+              </a:fontRef>
+            </p:style>
+            <p:txBody>
+              <a:bodyPr rtlCol="0" anchor="ctr"/>
+              <a:lstStyle/>
+              <a:p>
+                <a:pPr algn="ctr"/>
+                <a:r>
+                  <a:rPr lang="ko-KR" altLang="en-US" smtClean="0"/>
+                  <a:t>키</a:t>
+                </a:r>
+                <a:r>
+                  <a:rPr lang="en-US" altLang="ko-KR" smtClean="0"/>
+                  <a:t>1</a:t>
+                </a:r>
+                <a:endParaRPr lang="ko-KR" altLang="en-US"/>
+              </a:p>
+            </p:txBody>
+          </p:sp>
+          <p:sp>
+            <p:nvSpPr>
+              <p:cNvPr id="31" name="대각선 방향의 모서리가 잘린 사각형 30"/>
+              <p:cNvSpPr/>
+              <p:nvPr/>
+            </p:nvSpPr>
+            <p:spPr>
+              <a:xfrm>
+                <a:off x="6245677" y="825853"/>
+                <a:ext cx="653143" cy="317625"/>
+              </a:xfrm>
+              <a:prstGeom prst="snip2DiagRect">
+                <a:avLst/>
+              </a:prstGeom>
+            </p:spPr>
+            <p:style>
+              <a:lnRef idx="2">
+                <a:schemeClr val="accent6">
+                  <a:shade val="50000"/>
+                </a:schemeClr>
+              </a:lnRef>
+              <a:fillRef idx="1">
+                <a:schemeClr val="accent6"/>
+              </a:fillRef>
+              <a:effectRef idx="0">
+                <a:schemeClr val="accent6"/>
+              </a:effectRef>
+              <a:fontRef idx="minor">
+                <a:schemeClr val="lt1"/>
+              </a:fontRef>
+            </p:style>
+            <p:txBody>
+              <a:bodyPr rtlCol="0" anchor="ctr"/>
+              <a:lstStyle/>
+              <a:p>
+                <a:pPr algn="ctr"/>
+                <a:r>
+                  <a:rPr lang="ko-KR" altLang="en-US" smtClean="0"/>
+                  <a:t>키</a:t>
+                </a:r>
+                <a:r>
+                  <a:rPr lang="en-US" altLang="ko-KR"/>
+                  <a:t>2</a:t>
+                </a:r>
+                <a:endParaRPr lang="ko-KR" altLang="en-US"/>
+              </a:p>
+            </p:txBody>
+          </p:sp>
+          <p:sp>
+            <p:nvSpPr>
+              <p:cNvPr id="32" name="대각선 방향의 모서리가 잘린 사각형 31"/>
+              <p:cNvSpPr/>
+              <p:nvPr/>
+            </p:nvSpPr>
+            <p:spPr>
+              <a:xfrm>
+                <a:off x="7551963" y="825852"/>
+                <a:ext cx="653143" cy="317625"/>
+              </a:xfrm>
+              <a:prstGeom prst="snip2DiagRect">
+                <a:avLst/>
+              </a:prstGeom>
+            </p:spPr>
+            <p:style>
+              <a:lnRef idx="2">
+                <a:schemeClr val="accent6">
+                  <a:shade val="50000"/>
+                </a:schemeClr>
+              </a:lnRef>
+              <a:fillRef idx="1">
+                <a:schemeClr val="accent6"/>
+              </a:fillRef>
+              <a:effectRef idx="0">
+                <a:schemeClr val="accent6"/>
+              </a:effectRef>
+              <a:fontRef idx="minor">
+                <a:schemeClr val="lt1"/>
+              </a:fontRef>
+            </p:style>
+            <p:txBody>
+              <a:bodyPr rtlCol="0" anchor="ctr"/>
+              <a:lstStyle/>
+              <a:p>
+                <a:pPr algn="ctr"/>
+                <a:r>
+                  <a:rPr lang="en-US" altLang="ko-KR" smtClean="0"/>
+                  <a:t>…</a:t>
+                </a:r>
+                <a:endParaRPr lang="ko-KR" altLang="en-US"/>
+              </a:p>
+            </p:txBody>
+          </p:sp>
+          <p:sp>
+            <p:nvSpPr>
+              <p:cNvPr id="33" name="대각선 방향의 모서리가 잘린 사각형 32"/>
+              <p:cNvSpPr/>
+              <p:nvPr/>
+            </p:nvSpPr>
+            <p:spPr>
+              <a:xfrm>
+                <a:off x="8205106" y="825851"/>
+                <a:ext cx="653143" cy="317625"/>
+              </a:xfrm>
+              <a:prstGeom prst="snip2DiagRect">
+                <a:avLst/>
+              </a:prstGeom>
+            </p:spPr>
+            <p:style>
+              <a:lnRef idx="2">
+                <a:schemeClr val="accent6">
+                  <a:shade val="50000"/>
+                </a:schemeClr>
+              </a:lnRef>
+              <a:fillRef idx="1">
+                <a:schemeClr val="accent6"/>
+              </a:fillRef>
+              <a:effectRef idx="0">
+                <a:schemeClr val="accent6"/>
+              </a:effectRef>
+              <a:fontRef idx="minor">
+                <a:schemeClr val="lt1"/>
+              </a:fontRef>
+            </p:style>
+            <p:txBody>
+              <a:bodyPr rtlCol="0" anchor="ctr"/>
+              <a:lstStyle/>
+              <a:p>
+                <a:pPr algn="ctr"/>
+                <a:r>
+                  <a:rPr lang="ko-KR" altLang="en-US" smtClean="0"/>
+                  <a:t>키</a:t>
+                </a:r>
+                <a:r>
+                  <a:rPr lang="en-US" altLang="ko-KR" smtClean="0"/>
+                  <a:t>N</a:t>
+                </a:r>
+                <a:endParaRPr lang="ko-KR" altLang="en-US"/>
+              </a:p>
+            </p:txBody>
+          </p:sp>
+        </p:grpSp>
+        <p:sp>
+          <p:nvSpPr>
+            <p:cNvPr id="34" name="오른쪽 중괄호 33"/>
+            <p:cNvSpPr/>
+            <p:nvPr/>
+          </p:nvSpPr>
+          <p:spPr>
+            <a:xfrm rot="16200000">
+              <a:off x="7315197" y="-451861"/>
+              <a:ext cx="334734" cy="2098225"/>
+            </a:xfrm>
+            <a:prstGeom prst="rightBrace">
+              <a:avLst>
+                <a:gd name="adj1" fmla="val 110772"/>
+                <a:gd name="adj2" fmla="val 50778"/>
+              </a:avLst>
+            </a:prstGeom>
+            <a:ln>
+              <a:solidFill>
+                <a:schemeClr val="tx1"/>
+              </a:solidFill>
+            </a:ln>
+          </p:spPr>
+          <p:style>
+            <a:lnRef idx="1">
+              <a:schemeClr val="accent1"/>
+            </a:lnRef>
+            <a:fillRef idx="0">
+              <a:schemeClr val="accent1"/>
+            </a:fillRef>
+            <a:effectRef idx="0">
+              <a:schemeClr val="accent1"/>
+            </a:effectRef>
+            <a:fontRef idx="minor">
+              <a:schemeClr val="tx1"/>
+            </a:fontRef>
+          </p:style>
+          <p:txBody>
+            <a:bodyPr rtlCol="0" anchor="ctr"/>
+            <a:lstStyle/>
+            <a:p>
+              <a:pPr algn="ctr"/>
+              <a:endParaRPr lang="ko-KR" altLang="en-US"/>
+            </a:p>
+          </p:txBody>
+        </p:sp>
+      </p:grpSp>
+      <p:sp>
+        <p:nvSpPr>
+          <p:cNvPr id="37" name="TextBox 36"/>
+          <p:cNvSpPr txBox="1"/>
+          <p:nvPr/>
+        </p:nvSpPr>
+        <p:spPr>
+          <a:xfrm>
+            <a:off x="6916506" y="274239"/>
+            <a:ext cx="653143" cy="369332"/>
+          </a:xfrm>
+          <a:prstGeom prst="rect">
+            <a:avLst/>
+          </a:prstGeom>
+          <a:noFill/>
+        </p:spPr>
+        <p:txBody>
+          <a:bodyPr wrap="square" rtlCol="0">
+            <a:spAutoFit/>
+          </a:bodyPr>
+          <a:lstStyle/>
+          <a:p>
+            <a:r>
+              <a:rPr lang="ko-KR" altLang="en-US" smtClean="0"/>
+              <a:t>정렬</a:t>
+            </a:r>
+            <a:endParaRPr lang="ko-KR" altLang="en-US"/>
+          </a:p>
+        </p:txBody>
+      </p:sp>
+      <p:cxnSp>
+        <p:nvCxnSpPr>
+          <p:cNvPr id="39" name="구부러진 연결선 38"/>
+          <p:cNvCxnSpPr>
+            <a:stCxn id="6" idx="2"/>
+            <a:endCxn id="7" idx="0"/>
+          </p:cNvCxnSpPr>
+          <p:nvPr/>
+        </p:nvCxnSpPr>
+        <p:spPr>
+          <a:xfrm rot="5400000">
+            <a:off x="2166258" y="514351"/>
+            <a:ext cx="1360714" cy="2846614"/>
+          </a:xfrm>
+          <a:prstGeom prst="curvedConnector3">
+            <a:avLst>
+              <a:gd name="adj1" fmla="val 9200"/>
+            </a:avLst>
+          </a:prstGeom>
+          <a:ln>
+            <a:solidFill>
+              <a:schemeClr val="accent2"/>
+            </a:solidFill>
+            <a:tailEnd type="triangle"/>
+          </a:ln>
+        </p:spPr>
+        <p:style>
+          <a:lnRef idx="1">
+            <a:schemeClr val="accent1"/>
+          </a:lnRef>
+          <a:fillRef idx="0">
+            <a:schemeClr val="accent1"/>
+          </a:fillRef>
+          <a:effectRef idx="0">
+            <a:schemeClr val="accent1"/>
+          </a:effectRef>
+          <a:fontRef idx="minor">
+            <a:schemeClr val="tx1"/>
+          </a:fontRef>
+        </p:style>
+      </p:cxnSp>
+      <p:sp>
+        <p:nvSpPr>
+          <p:cNvPr id="42" name="대각선 방향의 모서리가 잘린 사각형 41"/>
+          <p:cNvSpPr/>
+          <p:nvPr/>
+        </p:nvSpPr>
+        <p:spPr>
+          <a:xfrm>
+            <a:off x="1300846" y="1442936"/>
+            <a:ext cx="1273627" cy="215963"/>
+          </a:xfrm>
+          <a:prstGeom prst="snip2DiagRect">
+            <a:avLst/>
+          </a:prstGeom>
+        </p:spPr>
+        <p:style>
+          <a:lnRef idx="2">
+            <a:schemeClr val="accent6">
+              <a:shade val="50000"/>
+            </a:schemeClr>
+          </a:lnRef>
+          <a:fillRef idx="1">
+            <a:schemeClr val="accent6"/>
+          </a:fillRef>
+          <a:effectRef idx="0">
+            <a:schemeClr val="accent6"/>
+          </a:effectRef>
+          <a:fontRef idx="minor">
+            <a:schemeClr val="lt1"/>
+          </a:fontRef>
+        </p:style>
+        <p:txBody>
+          <a:bodyPr rtlCol="0" anchor="ctr"/>
+          <a:lstStyle/>
+          <a:p>
+            <a:pPr algn="ctr"/>
+            <a:r>
+              <a:rPr lang="ko-KR" altLang="en-US" sz="1200" smtClean="0"/>
+              <a:t>할당된 범위 </a:t>
+            </a:r>
+            <a:r>
+              <a:rPr lang="en-US" altLang="ko-KR" sz="1200" smtClean="0"/>
+              <a:t>1</a:t>
+            </a:r>
+            <a:endParaRPr lang="ko-KR" altLang="en-US" sz="1200"/>
+          </a:p>
+        </p:txBody>
+      </p:sp>
+      <p:cxnSp>
+        <p:nvCxnSpPr>
+          <p:cNvPr id="48" name="구부러진 연결선 47"/>
+          <p:cNvCxnSpPr>
+            <a:endCxn id="11" idx="0"/>
+          </p:cNvCxnSpPr>
+          <p:nvPr/>
+        </p:nvCxnSpPr>
+        <p:spPr>
+          <a:xfrm rot="5400000">
+            <a:off x="3184947" y="1533041"/>
+            <a:ext cx="1299092" cy="870857"/>
+          </a:xfrm>
+          <a:prstGeom prst="curvedConnector3">
+            <a:avLst>
+              <a:gd name="adj1" fmla="val 86451"/>
+            </a:avLst>
+          </a:prstGeom>
+          <a:ln>
+            <a:solidFill>
+              <a:schemeClr val="accent2"/>
+            </a:solidFill>
+            <a:tailEnd type="triangle"/>
+          </a:ln>
+        </p:spPr>
+        <p:style>
+          <a:lnRef idx="1">
+            <a:schemeClr val="accent1"/>
+          </a:lnRef>
+          <a:fillRef idx="0">
+            <a:schemeClr val="accent1"/>
+          </a:fillRef>
+          <a:effectRef idx="0">
+            <a:schemeClr val="accent1"/>
+          </a:effectRef>
+          <a:fontRef idx="minor">
+            <a:schemeClr val="tx1"/>
+          </a:fontRef>
+        </p:style>
+      </p:cxnSp>
+      <p:sp>
+        <p:nvSpPr>
+          <p:cNvPr id="53" name="대각선 방향의 모서리가 잘린 사각형 52"/>
+          <p:cNvSpPr/>
+          <p:nvPr/>
+        </p:nvSpPr>
+        <p:spPr>
+          <a:xfrm>
+            <a:off x="3483426" y="1714501"/>
+            <a:ext cx="590552" cy="224910"/>
+          </a:xfrm>
+          <a:prstGeom prst="snip2DiagRect">
+            <a:avLst/>
+          </a:prstGeom>
+        </p:spPr>
+        <p:style>
+          <a:lnRef idx="2">
+            <a:schemeClr val="accent6">
+              <a:shade val="50000"/>
+            </a:schemeClr>
+          </a:lnRef>
+          <a:fillRef idx="1">
+            <a:schemeClr val="accent6"/>
+          </a:fillRef>
+          <a:effectRef idx="0">
+            <a:schemeClr val="accent6"/>
+          </a:effectRef>
+          <a:fontRef idx="minor">
+            <a:schemeClr val="lt1"/>
+          </a:fontRef>
+        </p:style>
+        <p:txBody>
+          <a:bodyPr rtlCol="0" anchor="ctr"/>
+          <a:lstStyle/>
+          <a:p>
+            <a:pPr algn="ctr"/>
+            <a:r>
+              <a:rPr lang="ko-KR" altLang="en-US" sz="1200" smtClean="0"/>
+              <a:t>키</a:t>
+            </a:r>
+            <a:r>
+              <a:rPr lang="en-US" altLang="ko-KR" sz="1200"/>
+              <a:t>2</a:t>
+            </a:r>
+            <a:endParaRPr lang="ko-KR" altLang="en-US" sz="1200"/>
+          </a:p>
+        </p:txBody>
+      </p:sp>
+      <p:sp>
+        <p:nvSpPr>
+          <p:cNvPr id="54" name="대각선 방향의 모서리가 잘린 사각형 53"/>
+          <p:cNvSpPr/>
+          <p:nvPr/>
+        </p:nvSpPr>
+        <p:spPr>
+          <a:xfrm>
+            <a:off x="4501240" y="1714595"/>
+            <a:ext cx="590552" cy="224910"/>
+          </a:xfrm>
+          <a:prstGeom prst="snip2DiagRect">
+            <a:avLst/>
+          </a:prstGeom>
+        </p:spPr>
+        <p:style>
+          <a:lnRef idx="2">
+            <a:schemeClr val="accent6">
+              <a:shade val="50000"/>
+            </a:schemeClr>
+          </a:lnRef>
+          <a:fillRef idx="1">
+            <a:schemeClr val="accent6"/>
+          </a:fillRef>
+          <a:effectRef idx="0">
+            <a:schemeClr val="accent6"/>
+          </a:effectRef>
+          <a:fontRef idx="minor">
+            <a:schemeClr val="lt1"/>
+          </a:fontRef>
+        </p:style>
+        <p:txBody>
+          <a:bodyPr rtlCol="0" anchor="ctr"/>
+          <a:lstStyle/>
+          <a:p>
+            <a:pPr algn="ctr"/>
+            <a:r>
+              <a:rPr lang="en-US" altLang="ko-KR" sz="1200" smtClean="0"/>
+              <a:t>…</a:t>
+            </a:r>
+            <a:endParaRPr lang="ko-KR" altLang="en-US" sz="1200"/>
+          </a:p>
+        </p:txBody>
+      </p:sp>
+      <p:sp>
+        <p:nvSpPr>
+          <p:cNvPr id="55" name="대각선 방향의 모서리가 잘린 사각형 54"/>
+          <p:cNvSpPr/>
+          <p:nvPr/>
+        </p:nvSpPr>
+        <p:spPr>
+          <a:xfrm>
+            <a:off x="6003469" y="1979541"/>
+            <a:ext cx="590552" cy="224910"/>
+          </a:xfrm>
+          <a:prstGeom prst="snip2DiagRect">
+            <a:avLst/>
+          </a:prstGeom>
+        </p:spPr>
+        <p:style>
+          <a:lnRef idx="2">
+            <a:schemeClr val="accent6">
+              <a:shade val="50000"/>
+            </a:schemeClr>
+          </a:lnRef>
+          <a:fillRef idx="1">
+            <a:schemeClr val="accent6"/>
+          </a:fillRef>
+          <a:effectRef idx="0">
+            <a:schemeClr val="accent6"/>
+          </a:effectRef>
+          <a:fontRef idx="minor">
+            <a:schemeClr val="lt1"/>
+          </a:fontRef>
+        </p:style>
+        <p:txBody>
+          <a:bodyPr rtlCol="0" anchor="ctr"/>
+          <a:lstStyle/>
+          <a:p>
+            <a:pPr algn="ctr"/>
+            <a:r>
+              <a:rPr lang="ko-KR" altLang="en-US" sz="1200" smtClean="0"/>
+              <a:t>키</a:t>
+            </a:r>
+            <a:r>
+              <a:rPr lang="en-US" altLang="ko-KR" sz="1200"/>
+              <a:t>N</a:t>
+            </a:r>
+            <a:endParaRPr lang="ko-KR" altLang="en-US" sz="1200"/>
+          </a:p>
+        </p:txBody>
+      </p:sp>
+      <p:sp>
+        <p:nvSpPr>
+          <p:cNvPr id="56" name="대각선 방향의 모서리가 잘린 사각형 55"/>
+          <p:cNvSpPr/>
+          <p:nvPr/>
+        </p:nvSpPr>
+        <p:spPr>
+          <a:xfrm>
+            <a:off x="3393623" y="2204451"/>
+            <a:ext cx="1273627" cy="215963"/>
+          </a:xfrm>
+          <a:prstGeom prst="snip2DiagRect">
+            <a:avLst/>
+          </a:prstGeom>
+        </p:spPr>
+        <p:style>
+          <a:lnRef idx="2">
+            <a:schemeClr val="accent6">
+              <a:shade val="50000"/>
+            </a:schemeClr>
+          </a:lnRef>
+          <a:fillRef idx="1">
+            <a:schemeClr val="accent6"/>
+          </a:fillRef>
+          <a:effectRef idx="0">
+            <a:schemeClr val="accent6"/>
+          </a:effectRef>
+          <a:fontRef idx="minor">
+            <a:schemeClr val="lt1"/>
+          </a:fontRef>
+        </p:style>
+        <p:txBody>
+          <a:bodyPr rtlCol="0" anchor="ctr"/>
+          <a:lstStyle/>
+          <a:p>
+            <a:pPr algn="ctr"/>
+            <a:r>
+              <a:rPr lang="ko-KR" altLang="en-US" sz="1200" smtClean="0"/>
+              <a:t>할당된 범위 </a:t>
+            </a:r>
+            <a:r>
+              <a:rPr lang="en-US" altLang="ko-KR" sz="1200"/>
+              <a:t>2</a:t>
+            </a:r>
+            <a:endParaRPr lang="ko-KR" altLang="en-US" sz="1200"/>
+          </a:p>
+        </p:txBody>
+      </p:sp>
+      <p:cxnSp>
+        <p:nvCxnSpPr>
+          <p:cNvPr id="57" name="구부러진 연결선 56"/>
+          <p:cNvCxnSpPr>
+            <a:stCxn id="6" idx="2"/>
+            <a:endCxn id="20" idx="0"/>
+          </p:cNvCxnSpPr>
+          <p:nvPr/>
+        </p:nvCxnSpPr>
+        <p:spPr>
+          <a:xfrm rot="16200000" flipH="1">
+            <a:off x="4142014" y="1385209"/>
+            <a:ext cx="1360714" cy="1104898"/>
+          </a:xfrm>
+          <a:prstGeom prst="curvedConnector3">
+            <a:avLst>
+              <a:gd name="adj1" fmla="val 62600"/>
+            </a:avLst>
+          </a:prstGeom>
+          <a:ln>
+            <a:solidFill>
+              <a:schemeClr val="accent2"/>
+            </a:solidFill>
+            <a:tailEnd type="triangle"/>
+          </a:ln>
+        </p:spPr>
+        <p:style>
+          <a:lnRef idx="1">
+            <a:schemeClr val="accent1"/>
+          </a:lnRef>
+          <a:fillRef idx="0">
+            <a:schemeClr val="accent1"/>
+          </a:fillRef>
+          <a:effectRef idx="0">
+            <a:schemeClr val="accent1"/>
+          </a:effectRef>
+          <a:fontRef idx="minor">
+            <a:schemeClr val="tx1"/>
+          </a:fontRef>
+        </p:style>
+      </p:cxnSp>
+      <p:cxnSp>
+        <p:nvCxnSpPr>
+          <p:cNvPr id="61" name="구부러진 연결선 60"/>
+          <p:cNvCxnSpPr>
+            <a:stCxn id="6" idx="2"/>
+            <a:endCxn id="14" idx="0"/>
+          </p:cNvCxnSpPr>
+          <p:nvPr/>
+        </p:nvCxnSpPr>
+        <p:spPr>
+          <a:xfrm rot="16200000" flipH="1">
+            <a:off x="5159828" y="367395"/>
+            <a:ext cx="1360714" cy="3140526"/>
+          </a:xfrm>
+          <a:prstGeom prst="curvedConnector3">
+            <a:avLst>
+              <a:gd name="adj1" fmla="val 15200"/>
+            </a:avLst>
+          </a:prstGeom>
+          <a:ln>
+            <a:solidFill>
+              <a:schemeClr val="accent2"/>
+            </a:solidFill>
+            <a:tailEnd type="triangle"/>
+          </a:ln>
+        </p:spPr>
+        <p:style>
+          <a:lnRef idx="1">
+            <a:schemeClr val="accent1"/>
+          </a:lnRef>
+          <a:fillRef idx="0">
+            <a:schemeClr val="accent1"/>
+          </a:fillRef>
+          <a:effectRef idx="0">
+            <a:schemeClr val="accent1"/>
+          </a:effectRef>
+          <a:fontRef idx="minor">
+            <a:schemeClr val="tx1"/>
+          </a:fontRef>
+        </p:style>
+      </p:cxnSp>
+      <p:sp>
+        <p:nvSpPr>
+          <p:cNvPr id="65" name="대각선 방향의 모서리가 잘린 사각형 64"/>
+          <p:cNvSpPr/>
+          <p:nvPr/>
+        </p:nvSpPr>
+        <p:spPr>
+          <a:xfrm>
+            <a:off x="6365421" y="1598074"/>
+            <a:ext cx="1273627" cy="215963"/>
+          </a:xfrm>
+          <a:prstGeom prst="snip2DiagRect">
+            <a:avLst/>
+          </a:prstGeom>
+        </p:spPr>
+        <p:style>
+          <a:lnRef idx="2">
+            <a:schemeClr val="accent6">
+              <a:shade val="50000"/>
+            </a:schemeClr>
+          </a:lnRef>
+          <a:fillRef idx="1">
+            <a:schemeClr val="accent6"/>
+          </a:fillRef>
+          <a:effectRef idx="0">
+            <a:schemeClr val="accent6"/>
+          </a:effectRef>
+          <a:fontRef idx="minor">
+            <a:schemeClr val="lt1"/>
+          </a:fontRef>
+        </p:style>
+        <p:txBody>
+          <a:bodyPr rtlCol="0" anchor="ctr"/>
+          <a:lstStyle/>
+          <a:p>
+            <a:pPr algn="ctr"/>
+            <a:r>
+              <a:rPr lang="ko-KR" altLang="en-US" sz="1200" smtClean="0"/>
+              <a:t>할당된 범위 </a:t>
+            </a:r>
+            <a:r>
+              <a:rPr lang="en-US" altLang="ko-KR" sz="1200"/>
+              <a:t>N</a:t>
+            </a:r>
+            <a:endParaRPr lang="ko-KR" altLang="en-US" sz="1200"/>
+          </a:p>
+        </p:txBody>
+      </p:sp>
+    </p:spTree>
+    <p:extLst>
+      <p:ext uri="{BB962C8B-B14F-4D97-AF65-F5344CB8AC3E}">
+        <p14:creationId xmlns:p14="http://schemas.microsoft.com/office/powerpoint/2010/main" val="657347299"/>
+      </p:ext>
+    </p:extLst>
+  </p:cSld>
+  <p:clrMapOvr>
+    <a:masterClrMapping/>
+  </p:clrMapOvr>
+  <p:timing>
+    <p:tnLst>
+      <p:par>
+        <p:cTn id="1" dur="indefinite" restart="never" nodeType="tmRoot"/>
+      </p:par>
+    </p:tnLst>
+  </p:timing>
+</p:sld>
+</file>
+
+<file path=ppt/slides/slide7.xml><?xml version="1.0" encoding="utf-8"?>
+<p:sld xmlns:a="http://schemas.openxmlformats.org/drawingml/2006/main" xmlns:r="http://schemas.openxmlformats.org/officeDocument/2006/relationships" xmlns:p="http://schemas.openxmlformats.org/presentationml/2006/main">
+  <p:cSld>
+    <p:spTree>
+      <p:nvGrpSpPr>
+        <p:cNvPr id="1" name=""/>
+        <p:cNvGrpSpPr/>
+        <p:nvPr/>
+      </p:nvGrpSpPr>
+      <p:grpSpPr>
+        <a:xfrm>
+          <a:off x="0" y="0"/>
+          <a:ext cx="0" cy="0"/>
+          <a:chOff x="0" y="0"/>
+          <a:chExt cx="0" cy="0"/>
+        </a:xfrm>
+      </p:grpSpPr>
+      <p:sp>
+        <p:nvSpPr>
+          <p:cNvPr id="4" name="TextBox 3"/>
+          <p:cNvSpPr txBox="1"/>
+          <p:nvPr/>
+        </p:nvSpPr>
+        <p:spPr>
+          <a:xfrm>
+            <a:off x="326571" y="285750"/>
+            <a:ext cx="6996793" cy="369332"/>
+          </a:xfrm>
+          <a:prstGeom prst="rect">
+            <a:avLst/>
+          </a:prstGeom>
+          <a:noFill/>
+        </p:spPr>
+        <p:txBody>
+          <a:bodyPr wrap="square" rtlCol="0">
+            <a:spAutoFit/>
+          </a:bodyPr>
+          <a:lstStyle/>
+          <a:p>
+            <a:r>
+              <a:rPr lang="ko-KR" altLang="en-US" smtClean="0"/>
+              <a:t>키 범위 할당을 위한 주인 노드와 노예 노드의 통신</a:t>
+            </a:r>
+            <a:r>
+              <a:rPr lang="en-US" altLang="ko-KR" smtClean="0"/>
+              <a:t>(1)</a:t>
+            </a:r>
+            <a:endParaRPr lang="ko-KR" altLang="en-US"/>
+          </a:p>
+        </p:txBody>
+      </p:sp>
+      <mc:AlternateContent xmlns:mc="http://schemas.openxmlformats.org/markup-compatibility/2006">
+        <mc:Choice xmlns:a14="http://schemas.microsoft.com/office/drawing/2010/main" Requires="a14">
+          <p:sp>
+            <p:nvSpPr>
+              <p:cNvPr id="5" name="TextBox 4"/>
+              <p:cNvSpPr txBox="1"/>
+              <p:nvPr/>
+            </p:nvSpPr>
+            <p:spPr>
+              <a:xfrm>
+                <a:off x="326570" y="887186"/>
+                <a:ext cx="10499273" cy="4801314"/>
+              </a:xfrm>
+              <a:prstGeom prst="rect">
+                <a:avLst/>
+              </a:prstGeom>
+              <a:noFill/>
+            </p:spPr>
+            <p:txBody>
+              <a:bodyPr wrap="square" rtlCol="0">
+                <a:spAutoFit/>
+              </a:bodyPr>
+              <a:lstStyle/>
+              <a:p>
+                <a:r>
+                  <a:rPr lang="ko-KR" altLang="en-US" strike="sngStrike" smtClean="0"/>
+                  <a:t>노드 커넥션 서비스에 새로운 </a:t>
+                </a:r>
+                <a:r>
+                  <a:rPr lang="en-US" altLang="ko-KR" strike="sngStrike" smtClean="0"/>
+                  <a:t>rpc</a:t>
+                </a:r>
+                <a:r>
+                  <a:rPr lang="ko-KR" altLang="en-US" strike="sngStrike" smtClean="0"/>
+                  <a:t>인 </a:t>
+                </a:r>
+                <a:r>
+                  <a:rPr lang="en-US" altLang="ko-KR" strike="sngStrike" smtClean="0"/>
+                  <a:t>KeySubmission </a:t>
+                </a:r>
+                <a:r>
+                  <a:rPr lang="ko-KR" altLang="en-US" strike="sngStrike" smtClean="0"/>
+                  <a:t>추가</a:t>
+                </a:r>
+                <a:endParaRPr lang="en-US" altLang="ko-KR" strike="sngStrike" smtClean="0"/>
+              </a:p>
+              <a:p>
+                <a:pPr marL="285750" indent="-285750">
+                  <a:buFontTx/>
+                  <a:buChar char="-"/>
+                </a:pPr>
+                <a:r>
+                  <a:rPr lang="ko-KR" altLang="en-US" strike="sngStrike" smtClean="0"/>
+                  <a:t>새로운 메시지 타입정의에 </a:t>
+                </a:r>
+                <a:r>
+                  <a:rPr lang="en-US" altLang="ko-KR" strike="sngStrike" smtClean="0"/>
+                  <a:t>Scala</a:t>
+                </a:r>
+                <a:r>
+                  <a:rPr lang="ko-KR" altLang="en-US" strike="sngStrike" smtClean="0"/>
+                  <a:t>의 </a:t>
+                </a:r>
+                <a:r>
+                  <a:rPr lang="en-US" altLang="ko-KR" strike="sngStrike" smtClean="0"/>
+                  <a:t>case class </a:t>
+                </a:r>
+                <a:r>
+                  <a:rPr lang="ko-KR" altLang="en-US" strike="sngStrike" smtClean="0"/>
+                  <a:t>를 그대로 이용</a:t>
+                </a:r>
+                <a:r>
+                  <a:rPr lang="en-US" altLang="ko-KR" strike="sngStrike" smtClean="0"/>
+                  <a:t>(grpc </a:t>
+                </a:r>
+                <a:r>
+                  <a:rPr lang="ko-KR" altLang="en-US" strike="sngStrike" smtClean="0"/>
+                  <a:t>구현</a:t>
+                </a:r>
+                <a:r>
+                  <a:rPr lang="en-US" altLang="ko-KR" strike="sngStrike" smtClean="0"/>
+                  <a:t>)</a:t>
+                </a:r>
+              </a:p>
+              <a:p>
+                <a:pPr marL="285750" indent="-285750">
+                  <a:buFontTx/>
+                  <a:buChar char="-"/>
+                </a:pPr>
+                <a:r>
+                  <a:rPr lang="ko-KR" altLang="en-US" strike="sngStrike" smtClean="0"/>
+                  <a:t>같은 서비스에서 메시지를 </a:t>
+                </a:r>
+                <a:r>
+                  <a:rPr lang="en-US" altLang="ko-KR" strike="sngStrike" smtClean="0"/>
+                  <a:t>case </a:t>
+                </a:r>
+                <a:r>
+                  <a:rPr lang="ko-KR" altLang="en-US" strike="sngStrike" smtClean="0"/>
+                  <a:t>디스패치해서 다른 </a:t>
+                </a:r>
+                <a:r>
+                  <a:rPr lang="en-US" altLang="ko-KR" strike="sngStrike" smtClean="0"/>
+                  <a:t>rpc </a:t>
+                </a:r>
+                <a:r>
+                  <a:rPr lang="ko-KR" altLang="en-US" strike="sngStrike" smtClean="0"/>
+                  <a:t>실행</a:t>
+                </a:r>
+                <a:endParaRPr lang="en-US" altLang="ko-KR" strike="sngStrike" smtClean="0"/>
+              </a:p>
+              <a:p>
+                <a:endParaRPr lang="en-US" altLang="ko-KR"/>
+              </a:p>
+              <a:p>
+                <a:r>
+                  <a:rPr lang="ko-KR" altLang="en-US" smtClean="0"/>
+                  <a:t>노드의 개수 </a:t>
+                </a:r>
+                <a:r>
+                  <a:rPr lang="en-US" altLang="ko-KR" smtClean="0"/>
+                  <a:t>N</a:t>
+                </a:r>
+                <a:r>
+                  <a:rPr lang="ko-KR" altLang="en-US" smtClean="0"/>
+                  <a:t>이 작다고 가정하자 </a:t>
+                </a:r>
+                <a:r>
+                  <a:rPr lang="en-US" altLang="ko-KR" smtClean="0"/>
+                  <a:t>(</a:t>
+                </a:r>
+                <a:r>
+                  <a:rPr lang="ko-KR" altLang="en-US" smtClean="0"/>
+                  <a:t>많아야 몇 백 대</a:t>
+                </a:r>
+                <a:r>
+                  <a:rPr lang="en-US" altLang="ko-KR" smtClean="0"/>
+                  <a:t>)</a:t>
+                </a:r>
+              </a:p>
+              <a:p>
+                <a:r>
+                  <a:rPr lang="en-US" altLang="ko-KR" smtClean="0"/>
+                  <a:t>-  </a:t>
+                </a:r>
+                <a:r>
+                  <a:rPr lang="ko-KR" altLang="en-US" smtClean="0"/>
+                  <a:t>주인 노드는 모든 키 샘플 </a:t>
+                </a:r>
+                <a:r>
+                  <a:rPr lang="en-US" altLang="ko-KR" smtClean="0"/>
+                  <a:t>N </a:t>
+                </a:r>
+                <a:r>
+                  <a:rPr lang="ko-KR" altLang="en-US" smtClean="0"/>
+                  <a:t>개가 다 제출할 때까지 응답을 대기</a:t>
+                </a:r>
+                <a:endParaRPr lang="en-US" altLang="ko-KR" smtClean="0"/>
+              </a:p>
+              <a:p>
+                <a:pPr marL="285750" indent="-285750">
+                  <a:buFontTx/>
+                  <a:buChar char="-"/>
+                </a:pPr>
+                <a:r>
+                  <a:rPr lang="en-US" altLang="ko-KR" smtClean="0"/>
+                  <a:t>N</a:t>
+                </a:r>
+                <a:r>
+                  <a:rPr lang="ko-KR" altLang="en-US" smtClean="0"/>
+                  <a:t>개의 샘플이 모두 제출되고 나서 그것들을 정렬하는 비용도 작음</a:t>
+                </a:r>
+                <a:endParaRPr lang="en-US" altLang="ko-KR" smtClean="0"/>
+              </a:p>
+              <a:p>
+                <a:pPr marL="285750" indent="-285750">
+                  <a:buFontTx/>
+                  <a:buChar char="-"/>
+                </a:pPr>
+                <a:r>
+                  <a:rPr lang="ko-KR" altLang="en-US" smtClean="0"/>
+                  <a:t>그 다음 각각의 노드에 할당된 범위를 응답으로 줌</a:t>
+                </a:r>
+                <a:endParaRPr lang="en-US" altLang="ko-KR" smtClean="0"/>
+              </a:p>
+              <a:p>
+                <a:pPr marL="285750" indent="-285750">
+                  <a:buFontTx/>
+                  <a:buChar char="-"/>
+                </a:pPr>
+                <a:endParaRPr lang="en-US" altLang="ko-KR"/>
+              </a:p>
+              <a:p>
+                <a:r>
+                  <a:rPr lang="ko-KR" altLang="en-US" smtClean="0"/>
+                  <a:t>이 과정에서 동시성 문제는 중요하지 않다</a:t>
+                </a:r>
+                <a:endParaRPr lang="en-US" altLang="ko-KR" smtClean="0"/>
+              </a:p>
+              <a:p>
+                <a:pPr marL="285750" indent="-285750">
+                  <a:buFontTx/>
+                  <a:buChar char="-"/>
+                </a:pPr>
+                <a:r>
+                  <a:rPr lang="ko-KR" altLang="en-US" smtClean="0"/>
+                  <a:t>한 개의 키 샘플링 과정의 비용이 작다</a:t>
+                </a:r>
+                <a:endParaRPr lang="en-US" altLang="ko-KR" smtClean="0"/>
+              </a:p>
+              <a:p>
+                <a:pPr marL="285750" indent="-285750">
+                  <a:buFontTx/>
+                  <a:buChar char="-"/>
+                </a:pPr>
+                <a:r>
+                  <a:rPr lang="ko-KR" altLang="en-US" smtClean="0"/>
+                  <a:t>정렬 후 키 할당의 비용 또한 작다</a:t>
+                </a:r>
+                <a:endParaRPr lang="en-US" altLang="ko-KR" smtClean="0"/>
+              </a:p>
+              <a:p>
+                <a:pPr marL="285750" indent="-285750">
+                  <a:buFontTx/>
+                  <a:buChar char="-"/>
+                </a:pPr>
+                <a:endParaRPr lang="en-US" altLang="ko-KR"/>
+              </a:p>
+              <a:p>
+                <a:pPr marL="285750" indent="-285750">
+                  <a:buFontTx/>
+                  <a:buChar char="-"/>
+                </a:pPr>
+                <a:endParaRPr lang="en-US" altLang="ko-KR" smtClean="0"/>
+              </a:p>
+              <a:p>
+                <a:r>
+                  <a:rPr lang="ko-KR" altLang="en-US" smtClean="0"/>
+                  <a:t>예상되는 문제</a:t>
+                </a:r>
+                <a:endParaRPr lang="en-US" altLang="ko-KR" smtClean="0"/>
+              </a:p>
+              <a:p>
+                <a:r>
+                  <a:rPr lang="ko-KR" altLang="en-US" smtClean="0">
+                    <a:solidFill>
+                      <a:srgbClr val="FF0000"/>
+                    </a:solidFill>
+                  </a:rPr>
+                  <a:t>각각의 노드는 샘플링된 키와 관련 없는 키 영역을 맡게 된다</a:t>
+                </a:r>
+                <a:r>
+                  <a:rPr lang="en-US" altLang="ko-KR" smtClean="0">
+                    <a:solidFill>
+                      <a:srgbClr val="FF0000"/>
+                    </a:solidFill>
+                  </a:rPr>
+                  <a:t> (X)</a:t>
+                </a:r>
+              </a:p>
+              <a:p>
+                <a14:m>
+                  <m:oMath xmlns:m="http://schemas.openxmlformats.org/officeDocument/2006/math">
+                    <m:r>
+                      <a:rPr lang="ko-KR" altLang="en-US" i="1" smtClean="0">
+                        <a:solidFill>
+                          <a:srgbClr val="FF0000"/>
+                        </a:solidFill>
+                        <a:latin typeface="Cambria Math" panose="02040503050406030204" pitchFamily="18" charset="0"/>
+                      </a:rPr>
+                      <m:t>→</m:t>
+                    </m:r>
+                  </m:oMath>
+                </a14:m>
+                <a:r>
+                  <a:rPr lang="ko-KR" altLang="en-US" smtClean="0">
+                    <a:solidFill>
+                      <a:srgbClr val="FF0000"/>
+                    </a:solidFill>
+                  </a:rPr>
+                  <a:t>샘플링된 키의 순서와 노드의 순서를 일치시킨다 </a:t>
+                </a:r>
+                <a:r>
+                  <a:rPr lang="en-US" altLang="ko-KR" smtClean="0">
+                    <a:solidFill>
+                      <a:srgbClr val="FF0000"/>
+                    </a:solidFill>
+                  </a:rPr>
+                  <a:t>(O)</a:t>
+                </a:r>
+              </a:p>
+            </p:txBody>
+          </p:sp>
+        </mc:Choice>
+        <mc:Fallback>
+          <p:sp>
+            <p:nvSpPr>
+              <p:cNvPr id="5" name="TextBox 4"/>
+              <p:cNvSpPr txBox="1">
+                <a:spLocks noRot="1" noChangeAspect="1" noMove="1" noResize="1" noEditPoints="1" noAdjustHandles="1" noChangeArrowheads="1" noChangeShapeType="1" noTextEdit="1"/>
+              </p:cNvSpPr>
+              <p:nvPr/>
+            </p:nvSpPr>
+            <p:spPr>
+              <a:xfrm>
+                <a:off x="326570" y="887186"/>
+                <a:ext cx="10499273" cy="4801314"/>
+              </a:xfrm>
+              <a:prstGeom prst="rect">
+                <a:avLst/>
+              </a:prstGeom>
+              <a:blipFill>
+                <a:blip r:embed="rId2"/>
+                <a:stretch>
+                  <a:fillRect l="-639" t="-762" b="-1144"/>
+                </a:stretch>
+              </a:blipFill>
+            </p:spPr>
+            <p:txBody>
+              <a:bodyPr/>
+              <a:lstStyle/>
+              <a:p>
+                <a:r>
+                  <a:rPr lang="ko-KR" altLang="en-US">
+                    <a:noFill/>
+                  </a:rPr>
+                  <a:t> </a:t>
+                </a:r>
+              </a:p>
+            </p:txBody>
+          </p:sp>
+        </mc:Fallback>
+      </mc:AlternateContent>
+    </p:spTree>
+    <p:extLst>
+      <p:ext uri="{BB962C8B-B14F-4D97-AF65-F5344CB8AC3E}">
+        <p14:creationId xmlns:p14="http://schemas.microsoft.com/office/powerpoint/2010/main" val="236884554"/>
+      </p:ext>
+    </p:extLst>
+  </p:cSld>
+  <p:clrMapOvr>
+    <a:masterClrMapping/>
+  </p:clrMapOvr>
+  <p:timing>
+    <p:tnLst>
+      <p:par>
+        <p:cTn id="1" dur="indefinite" restart="never" nodeType="tmRoot"/>
+      </p:par>
+    </p:tnLst>
+  </p:timing>
+</p:sld>
+</file>
+
+<file path=ppt/slides/slide8.xml><?xml version="1.0" encoding="utf-8"?>
+<p:sld xmlns:a="http://schemas.openxmlformats.org/drawingml/2006/main" xmlns:r="http://schemas.openxmlformats.org/officeDocument/2006/relationships" xmlns:p="http://schemas.openxmlformats.org/presentationml/2006/main">
+  <p:cSld>
+    <p:spTree>
+      <p:nvGrpSpPr>
+        <p:cNvPr id="1" name=""/>
+        <p:cNvGrpSpPr/>
+        <p:nvPr/>
+      </p:nvGrpSpPr>
+      <p:grpSpPr>
+        <a:xfrm>
+          <a:off x="0" y="0"/>
+          <a:ext cx="0" cy="0"/>
+          <a:chOff x="0" y="0"/>
+          <a:chExt cx="0" cy="0"/>
+        </a:xfrm>
+      </p:grpSpPr>
+      <p:sp>
+        <p:nvSpPr>
+          <p:cNvPr id="4" name="TextBox 3"/>
+          <p:cNvSpPr txBox="1"/>
+          <p:nvPr/>
+        </p:nvSpPr>
+        <p:spPr>
+          <a:xfrm>
+            <a:off x="326571" y="285750"/>
+            <a:ext cx="6996793" cy="369332"/>
+          </a:xfrm>
+          <a:prstGeom prst="rect">
+            <a:avLst/>
+          </a:prstGeom>
+          <a:noFill/>
+        </p:spPr>
+        <p:txBody>
+          <a:bodyPr wrap="square" rtlCol="0">
+            <a:spAutoFit/>
+          </a:bodyPr>
+          <a:lstStyle/>
+          <a:p>
+            <a:r>
+              <a:rPr lang="ko-KR" altLang="en-US" smtClean="0"/>
+              <a:t>키 범위 할당을 위한 주인 노드와 노예 노드의 통신</a:t>
+            </a:r>
+            <a:r>
+              <a:rPr lang="en-US" altLang="ko-KR" smtClean="0"/>
+              <a:t>(2)</a:t>
+            </a:r>
+            <a:endParaRPr lang="ko-KR" altLang="en-US"/>
+          </a:p>
+        </p:txBody>
+      </p:sp>
+      <p:sp>
+        <p:nvSpPr>
+          <p:cNvPr id="5" name="TextBox 4"/>
+          <p:cNvSpPr txBox="1"/>
+          <p:nvPr/>
+        </p:nvSpPr>
+        <p:spPr>
+          <a:xfrm>
+            <a:off x="326570" y="887186"/>
+            <a:ext cx="10499273" cy="923330"/>
+          </a:xfrm>
+          <a:prstGeom prst="rect">
+            <a:avLst/>
+          </a:prstGeom>
+          <a:noFill/>
+        </p:spPr>
+        <p:txBody>
+          <a:bodyPr wrap="square" rtlCol="0">
+            <a:spAutoFit/>
+          </a:bodyPr>
+          <a:lstStyle/>
+          <a:p>
+            <a:r>
+              <a:rPr lang="ko-KR" altLang="en-US" smtClean="0"/>
+              <a:t>노드 커넥션 서비스에 요청하는 데이터 영역에 샘플링 된 키 하나를 처음부터 추가한다</a:t>
+            </a:r>
+            <a:endParaRPr lang="en-US" altLang="ko-KR"/>
+          </a:p>
+          <a:p>
+            <a:pPr marL="285750" indent="-285750">
+              <a:buFontTx/>
+              <a:buChar char="-"/>
+            </a:pPr>
+            <a:r>
+              <a:rPr lang="en-US" altLang="ko-KR" smtClean="0"/>
+              <a:t>10 </a:t>
+            </a:r>
+            <a:r>
+              <a:rPr lang="ko-KR" altLang="en-US" smtClean="0"/>
+              <a:t>바이트의 키 제출이 로드를 증가시키지 않는다</a:t>
+            </a:r>
+            <a:endParaRPr lang="en-US" altLang="ko-KR"/>
+          </a:p>
+          <a:p>
+            <a:pPr marL="285750" indent="-285750">
+              <a:buFontTx/>
+              <a:buChar char="-"/>
+            </a:pPr>
+            <a:r>
+              <a:rPr lang="ko-KR" altLang="en-US" smtClean="0"/>
+              <a:t>샘플링 과정 또한 비용이 크지 않아서 연결 시간을 지연시키지 않는다</a:t>
+            </a:r>
+            <a:endParaRPr lang="en-US" altLang="ko-KR" smtClean="0"/>
+          </a:p>
+        </p:txBody>
+      </p:sp>
+    </p:spTree>
+    <p:extLst>
+      <p:ext uri="{BB962C8B-B14F-4D97-AF65-F5344CB8AC3E}">
+        <p14:creationId xmlns:p14="http://schemas.microsoft.com/office/powerpoint/2010/main" val="532806326"/>
       </p:ext>
     </p:extLst>
   </p:cSld>

</xml_diff>

<commit_message>
Design key type for data sorting
</commit_message>
<xml_diff>
--- a/Design.pptx
+++ b/Design.pptx
@@ -10,9 +10,10 @@
     <p:sldId id="256" r:id="rId4"/>
     <p:sldId id="257" r:id="rId5"/>
     <p:sldId id="261" r:id="rId6"/>
-    <p:sldId id="258" r:id="rId7"/>
-    <p:sldId id="260" r:id="rId8"/>
-    <p:sldId id="259" r:id="rId9"/>
+    <p:sldId id="265" r:id="rId7"/>
+    <p:sldId id="258" r:id="rId8"/>
+    <p:sldId id="260" r:id="rId9"/>
+    <p:sldId id="259" r:id="rId10"/>
   </p:sldIdLst>
   <p:sldSz cx="12192000" cy="6858000"/>
   <p:notesSz cx="6858000" cy="9144000"/>
@@ -3119,7 +3120,6 @@
               <a:rPr lang="en-US" altLang="ko-KR" smtClean="0"/>
               <a:t>11:59pm)</a:t>
             </a:r>
-            <a:endParaRPr lang="en-US" altLang="ko-KR" smtClean="0"/>
           </a:p>
         </p:txBody>
       </p:sp>
@@ -3763,6 +3763,312 @@
 </file>
 
 <file path=ppt/slides/slide6.xml><?xml version="1.0" encoding="utf-8"?>
+<p:sld xmlns:a="http://schemas.openxmlformats.org/drawingml/2006/main" xmlns:r="http://schemas.openxmlformats.org/officeDocument/2006/relationships" xmlns:p="http://schemas.openxmlformats.org/presentationml/2006/main">
+  <p:cSld>
+    <p:spTree>
+      <p:nvGrpSpPr>
+        <p:cNvPr id="1" name=""/>
+        <p:cNvGrpSpPr/>
+        <p:nvPr/>
+      </p:nvGrpSpPr>
+      <p:grpSpPr>
+        <a:xfrm>
+          <a:off x="0" y="0"/>
+          <a:ext cx="0" cy="0"/>
+          <a:chOff x="0" y="0"/>
+          <a:chExt cx="0" cy="0"/>
+        </a:xfrm>
+      </p:grpSpPr>
+      <p:sp>
+        <p:nvSpPr>
+          <p:cNvPr id="4" name="TextBox 3"/>
+          <p:cNvSpPr txBox="1"/>
+          <p:nvPr/>
+        </p:nvSpPr>
+        <p:spPr>
+          <a:xfrm>
+            <a:off x="326571" y="285750"/>
+            <a:ext cx="6996793" cy="369332"/>
+          </a:xfrm>
+          <a:prstGeom prst="rect">
+            <a:avLst/>
+          </a:prstGeom>
+          <a:noFill/>
+        </p:spPr>
+        <p:txBody>
+          <a:bodyPr wrap="square" rtlCol="0">
+            <a:spAutoFit/>
+          </a:bodyPr>
+          <a:lstStyle/>
+          <a:p>
+            <a:r>
+              <a:rPr lang="ko-KR" altLang="en-US" smtClean="0"/>
+              <a:t>데이터 타입</a:t>
+            </a:r>
+            <a:endParaRPr lang="en-US" altLang="ko-KR" smtClean="0"/>
+          </a:p>
+        </p:txBody>
+      </p:sp>
+      <mc:AlternateContent xmlns:mc="http://schemas.openxmlformats.org/markup-compatibility/2006">
+        <mc:Choice xmlns:a14="http://schemas.microsoft.com/office/drawing/2010/main" Requires="a14">
+          <p:sp>
+            <p:nvSpPr>
+              <p:cNvPr id="5" name="TextBox 4"/>
+              <p:cNvSpPr txBox="1"/>
+              <p:nvPr/>
+            </p:nvSpPr>
+            <p:spPr>
+              <a:xfrm>
+                <a:off x="465364" y="1355271"/>
+                <a:ext cx="10030310" cy="2862322"/>
+              </a:xfrm>
+              <a:prstGeom prst="rect">
+                <a:avLst/>
+              </a:prstGeom>
+              <a:noFill/>
+            </p:spPr>
+            <p:txBody>
+              <a:bodyPr wrap="none" rtlCol="0">
+                <a:spAutoFit/>
+              </a:bodyPr>
+              <a:lstStyle/>
+              <a:p>
+                <a:r>
+                  <a:rPr lang="en-US" altLang="ko-KR" smtClean="0"/>
+                  <a:t>Key: immutable, comparable by dictionary order, byte sequence, length constraint</a:t>
+                </a:r>
+              </a:p>
+              <a:p>
+                <a14:m>
+                  <m:oMath xmlns:m="http://schemas.openxmlformats.org/officeDocument/2006/math">
+                    <m:r>
+                      <a:rPr lang="en-US" altLang="ko-KR" i="1" smtClean="0">
+                        <a:latin typeface="Cambria Math" panose="02040503050406030204" pitchFamily="18" charset="0"/>
+                        <a:ea typeface="Cambria Math" panose="02040503050406030204" pitchFamily="18" charset="0"/>
+                      </a:rPr>
+                      <m:t>→</m:t>
+                    </m:r>
+                  </m:oMath>
+                </a14:m>
+                <a:r>
+                  <a:rPr lang="en-US" altLang="ko-KR" smtClean="0"/>
+                  <a:t> Scala List[Byte] extends Ordering</a:t>
+                </a:r>
+              </a:p>
+              <a:p>
+                <a14:m>
+                  <m:oMath xmlns:m="http://schemas.openxmlformats.org/officeDocument/2006/math">
+                    <m:r>
+                      <a:rPr lang="en-US" altLang="ko-KR" i="1" smtClean="0">
+                        <a:latin typeface="Cambria Math" panose="02040503050406030204" pitchFamily="18" charset="0"/>
+                        <a:ea typeface="Cambria Math" panose="02040503050406030204" pitchFamily="18" charset="0"/>
+                      </a:rPr>
+                      <m:t>→</m:t>
+                    </m:r>
+                  </m:oMath>
+                </a14:m>
+                <a:r>
+                  <a:rPr lang="en-US" altLang="ko-KR" smtClean="0"/>
+                  <a:t> </a:t>
+                </a:r>
+                <a:r>
+                  <a:rPr lang="ko-KR" altLang="en-US" smtClean="0"/>
+                  <a:t>길이 제한을 강제하는 타입</a:t>
+                </a:r>
+                <a:r>
+                  <a:rPr lang="en-US" altLang="ko-KR" smtClean="0"/>
+                  <a:t>? </a:t>
+                </a:r>
+                <a:r>
+                  <a:rPr lang="en-US" altLang="ko-KR" smtClean="0"/>
+                  <a:t>constructor</a:t>
+                </a:r>
+                <a:r>
+                  <a:rPr lang="ko-KR" altLang="en-US" smtClean="0"/>
+                  <a:t>에 </a:t>
+                </a:r>
+                <a:r>
+                  <a:rPr lang="en-US" altLang="ko-KR" smtClean="0"/>
+                  <a:t>require </a:t>
+                </a:r>
+                <a:r>
+                  <a:rPr lang="ko-KR" altLang="en-US" smtClean="0"/>
+                  <a:t>활용</a:t>
+                </a:r>
+                <a:endParaRPr lang="en-US" altLang="ko-KR" smtClean="0"/>
+              </a:p>
+              <a:p>
+                <a:endParaRPr lang="en-US" altLang="ko-KR"/>
+              </a:p>
+              <a:p>
+                <a:r>
+                  <a:rPr lang="en-US" altLang="ko-KR" smtClean="0"/>
+                  <a:t>Slave: </a:t>
+                </a:r>
+                <a:endParaRPr lang="en-US" altLang="ko-KR"/>
+              </a:p>
+              <a:p>
+                <a:pPr marL="342900" indent="-342900">
+                  <a:buAutoNum type="arabicPeriod"/>
+                </a:pPr>
+                <a:r>
+                  <a:rPr lang="ko-KR" altLang="en-US" smtClean="0"/>
+                  <a:t>각 노예 노드의 주소</a:t>
+                </a:r>
+                <a:endParaRPr lang="en-US" altLang="ko-KR" smtClean="0"/>
+              </a:p>
+              <a:p>
+                <a:pPr marL="342900" indent="-342900">
+                  <a:buAutoNum type="arabicPeriod"/>
+                </a:pPr>
+                <a:r>
+                  <a:rPr lang="ko-KR" altLang="en-US" smtClean="0"/>
+                  <a:t>각 노예 노드의 범위 할당 정보 저장</a:t>
+                </a:r>
+                <a:r>
+                  <a:rPr lang="en-US" altLang="ko-KR"/>
+                  <a:t> </a:t>
+                </a:r>
+                <a14:m>
+                  <m:oMath xmlns:m="http://schemas.openxmlformats.org/officeDocument/2006/math">
+                    <m:r>
+                      <a:rPr lang="en-US" altLang="ko-KR" i="1">
+                        <a:latin typeface="Cambria Math" panose="02040503050406030204" pitchFamily="18" charset="0"/>
+                        <a:ea typeface="Cambria Math" panose="02040503050406030204" pitchFamily="18" charset="0"/>
+                      </a:rPr>
+                      <m:t>→</m:t>
+                    </m:r>
+                  </m:oMath>
+                </a14:m>
+                <a:r>
+                  <a:rPr lang="en-US" altLang="ko-KR" smtClean="0"/>
+                  <a:t> </a:t>
+                </a:r>
+                <a:r>
+                  <a:rPr lang="ko-KR" altLang="en-US" smtClean="0"/>
+                  <a:t>노드는 각각의 범위로 조회할 일이 가장 많을 것으로</a:t>
+                </a:r>
+                <a:endParaRPr lang="en-US" altLang="ko-KR" smtClean="0"/>
+              </a:p>
+              <a:p>
+                <a:r>
+                  <a:rPr lang="ko-KR" altLang="en-US" smtClean="0"/>
+                  <a:t>예상되므로 </a:t>
+                </a:r>
+                <a:r>
+                  <a:rPr lang="en-US" altLang="ko-KR" smtClean="0"/>
+                  <a:t>Map </a:t>
+                </a:r>
+                <a:r>
+                  <a:rPr lang="ko-KR" altLang="en-US" smtClean="0"/>
+                  <a:t>활용</a:t>
+                </a:r>
+                <a:endParaRPr lang="en-US" altLang="ko-KR" smtClean="0"/>
+              </a:p>
+              <a:p>
+                <a:endParaRPr lang="en-US" altLang="ko-KR"/>
+              </a:p>
+              <a:p>
+                <a:r>
+                  <a:rPr lang="en-US" altLang="ko-KR" smtClean="0"/>
+                  <a:t>key </a:t>
+                </a:r>
+                <a14:m>
+                  <m:oMath xmlns:m="http://schemas.openxmlformats.org/officeDocument/2006/math">
+                    <m:r>
+                      <a:rPr lang="en-US" altLang="ko-KR" i="1" smtClean="0">
+                        <a:latin typeface="Cambria Math" panose="02040503050406030204" pitchFamily="18" charset="0"/>
+                        <a:ea typeface="Cambria Math" panose="02040503050406030204" pitchFamily="18" charset="0"/>
+                      </a:rPr>
+                      <m:t>→</m:t>
+                    </m:r>
+                  </m:oMath>
+                </a14:m>
+                <a:r>
+                  <a:rPr lang="en-US" altLang="ko-KR" smtClean="0"/>
+                  <a:t> key </a:t>
+                </a:r>
+                <a:r>
+                  <a:rPr lang="ko-KR" altLang="en-US" smtClean="0"/>
+                  <a:t>범위 </a:t>
+                </a:r>
+                <a14:m>
+                  <m:oMath xmlns:m="http://schemas.openxmlformats.org/officeDocument/2006/math">
+                    <m:r>
+                      <a:rPr lang="en-US" altLang="ko-KR" i="1">
+                        <a:latin typeface="Cambria Math" panose="02040503050406030204" pitchFamily="18" charset="0"/>
+                        <a:ea typeface="Cambria Math" panose="02040503050406030204" pitchFamily="18" charset="0"/>
+                      </a:rPr>
+                      <m:t>→</m:t>
+                    </m:r>
+                  </m:oMath>
+                </a14:m>
+                <a:r>
+                  <a:rPr lang="en-US" altLang="ko-KR" smtClean="0"/>
+                  <a:t> </a:t>
+                </a:r>
+                <a:r>
+                  <a:rPr lang="ko-KR" altLang="en-US" smtClean="0"/>
+                  <a:t>노예노드 순서로 조회할 수 있는 데이터구조</a:t>
+                </a:r>
+                <a:endParaRPr lang="en-US" altLang="ko-KR" smtClean="0"/>
+              </a:p>
+            </p:txBody>
+          </p:sp>
+        </mc:Choice>
+        <mc:Fallback>
+          <p:sp>
+            <p:nvSpPr>
+              <p:cNvPr id="5" name="TextBox 4"/>
+              <p:cNvSpPr txBox="1">
+                <a:spLocks noRot="1" noChangeAspect="1" noMove="1" noResize="1" noEditPoints="1" noAdjustHandles="1" noChangeArrowheads="1" noChangeShapeType="1" noTextEdit="1"/>
+              </p:cNvSpPr>
+              <p:nvPr/>
+            </p:nvSpPr>
+            <p:spPr>
+              <a:xfrm>
+                <a:off x="465364" y="1355271"/>
+                <a:ext cx="10030310" cy="2862322"/>
+              </a:xfrm>
+              <a:prstGeom prst="rect">
+                <a:avLst/>
+              </a:prstGeom>
+              <a:blipFill>
+                <a:blip r:embed="rId2"/>
+                <a:stretch>
+                  <a:fillRect l="-608" t="-1064" b="-2340"/>
+                </a:stretch>
+              </a:blipFill>
+            </p:spPr>
+            <p:txBody>
+              <a:bodyPr/>
+              <a:lstStyle/>
+              <a:p>
+                <a:r>
+                  <a:rPr lang="ko-KR" altLang="en-US">
+                    <a:noFill/>
+                  </a:rPr>
+                  <a:t> </a:t>
+                </a:r>
+              </a:p>
+            </p:txBody>
+          </p:sp>
+        </mc:Fallback>
+      </mc:AlternateContent>
+    </p:spTree>
+    <p:extLst>
+      <p:ext uri="{BB962C8B-B14F-4D97-AF65-F5344CB8AC3E}">
+        <p14:creationId xmlns:p14="http://schemas.microsoft.com/office/powerpoint/2010/main" val="3127958919"/>
+      </p:ext>
+    </p:extLst>
+  </p:cSld>
+  <p:clrMapOvr>
+    <a:masterClrMapping/>
+  </p:clrMapOvr>
+</p:sld>
+</file>
+
+<file path=ppt/slides/slide7.xml><?xml version="1.0" encoding="utf-8"?>
 <p:sld xmlns:a="http://schemas.openxmlformats.org/drawingml/2006/main" xmlns:r="http://schemas.openxmlformats.org/officeDocument/2006/relationships" xmlns:p="http://schemas.openxmlformats.org/presentationml/2006/main">
   <p:cSld>
     <p:spTree>
@@ -5289,7 +5595,7 @@
 </p:sld>
 </file>
 
-<file path=ppt/slides/slide7.xml><?xml version="1.0" encoding="utf-8"?>
+<file path=ppt/slides/slide8.xml><?xml version="1.0" encoding="utf-8"?>
 <p:sld xmlns:a="http://schemas.openxmlformats.org/drawingml/2006/main" xmlns:r="http://schemas.openxmlformats.org/officeDocument/2006/relationships" xmlns:p="http://schemas.openxmlformats.org/presentationml/2006/main">
   <p:cSld>
     <p:spTree>
@@ -5340,8 +5646,8 @@
           </a:p>
         </p:txBody>
       </p:sp>
-      <mc:AlternateContent xmlns:mc="http://schemas.openxmlformats.org/markup-compatibility/2006">
-        <mc:Choice xmlns:a14="http://schemas.microsoft.com/office/drawing/2010/main" Requires="a14">
+      <mc:AlternateContent xmlns:mc="http://schemas.openxmlformats.org/markup-compatibility/2006" xmlns:a14="http://schemas.microsoft.com/office/drawing/2010/main">
+        <mc:Choice Requires="a14">
           <p:sp>
             <p:nvSpPr>
               <p:cNvPr id="5" name="TextBox 4"/>
@@ -5535,15 +5841,15 @@
               <a:p>
                 <a:r>
                   <a:rPr lang="ko-KR" altLang="en-US" smtClean="0"/>
-                  <a:t>이 과정에서 동시성 문제는 중요하지 않다</a:t>
+                  <a:t>이 과정에서 동시성이 문제가 중요하지 않다</a:t>
                 </a:r>
                 <a:endParaRPr lang="en-US" altLang="ko-KR" smtClean="0"/>
               </a:p>
               <a:p>
-                <a:pPr marL="285750" indent="-285750">
-                  <a:buFontTx/>
-                  <a:buChar char="-"/>
-                </a:pPr>
+                <a:r>
+                  <a:rPr lang="en-US" altLang="ko-KR" smtClean="0"/>
+                  <a:t>-  </a:t>
+                </a:r>
                 <a:r>
                   <a:rPr lang="ko-KR" altLang="en-US" smtClean="0"/>
                   <a:t>한 개의 키 샘플링 과정의 비용이 작다</a:t>
@@ -5551,10 +5857,10 @@
                 <a:endParaRPr lang="en-US" altLang="ko-KR" smtClean="0"/>
               </a:p>
               <a:p>
-                <a:pPr marL="285750" indent="-285750">
-                  <a:buFontTx/>
-                  <a:buChar char="-"/>
-                </a:pPr>
+                <a:r>
+                  <a:rPr lang="en-US" altLang="ko-KR" smtClean="0"/>
+                  <a:t>-  </a:t>
+                </a:r>
                 <a:r>
                   <a:rPr lang="ko-KR" altLang="en-US" smtClean="0"/>
                   <a:t>정렬 후 키 할당의 비용 또한 작다</a:t>
@@ -5634,7 +5940,7 @@
             </p:txBody>
           </p:sp>
         </mc:Choice>
-        <mc:Fallback>
+        <mc:Fallback xmlns="">
           <p:sp>
             <p:nvSpPr>
               <p:cNvPr id="5" name="TextBox 4"/>
@@ -5693,7 +5999,7 @@
 </p:sld>
 </file>
 
-<file path=ppt/slides/slide8.xml><?xml version="1.0" encoding="utf-8"?>
+<file path=ppt/slides/slide9.xml><?xml version="1.0" encoding="utf-8"?>
 <p:sld xmlns:a="http://schemas.openxmlformats.org/drawingml/2006/main" xmlns:r="http://schemas.openxmlformats.org/officeDocument/2006/relationships" xmlns:p="http://schemas.openxmlformats.org/presentationml/2006/main">
   <p:cSld>
     <p:spTree>

</xml_diff>

<commit_message>
Add report for milestone 2
</commit_message>
<xml_diff>
--- a/Design.pptx
+++ b/Design.pptx
@@ -14,6 +14,7 @@
     <p:sldId id="258" r:id="rId8"/>
     <p:sldId id="260" r:id="rId9"/>
     <p:sldId id="259" r:id="rId10"/>
+    <p:sldId id="266" r:id="rId11"/>
   </p:sldIdLst>
   <p:sldSz cx="12192000" cy="6858000"/>
   <p:notesSz cx="6858000" cy="9144000"/>
@@ -3143,6 +3144,747 @@
 </p:sld>
 </file>
 
+<file path=ppt/slides/slide10.xml><?xml version="1.0" encoding="utf-8"?>
+<p:sld xmlns:a="http://schemas.openxmlformats.org/drawingml/2006/main" xmlns:r="http://schemas.openxmlformats.org/officeDocument/2006/relationships" xmlns:p="http://schemas.openxmlformats.org/presentationml/2006/main">
+  <p:cSld>
+    <p:spTree>
+      <p:nvGrpSpPr>
+        <p:cNvPr id="1" name=""/>
+        <p:cNvGrpSpPr/>
+        <p:nvPr/>
+      </p:nvGrpSpPr>
+      <p:grpSpPr>
+        <a:xfrm>
+          <a:off x="0" y="0"/>
+          <a:ext cx="0" cy="0"/>
+          <a:chOff x="0" y="0"/>
+          <a:chExt cx="0" cy="0"/>
+        </a:xfrm>
+      </p:grpSpPr>
+      <p:sp>
+        <p:nvSpPr>
+          <p:cNvPr id="2" name="직사각형 1"/>
+          <p:cNvSpPr/>
+          <p:nvPr/>
+        </p:nvSpPr>
+        <p:spPr>
+          <a:xfrm>
+            <a:off x="624471" y="575200"/>
+            <a:ext cx="4435830" cy="553998"/>
+          </a:xfrm>
+          <a:prstGeom prst="rect">
+            <a:avLst/>
+          </a:prstGeom>
+          <a:noFill/>
+        </p:spPr>
+        <p:txBody>
+          <a:bodyPr wrap="none" lIns="91440" tIns="45720" rIns="91440" bIns="45720">
+            <a:spAutoFit/>
+          </a:bodyPr>
+          <a:lstStyle/>
+          <a:p>
+            <a:r>
+              <a:rPr lang="ko-KR" altLang="en-US" sz="3000" b="0" cap="none" spc="0" smtClean="0">
+                <a:ln w="0"/>
+                <a:solidFill>
+                  <a:schemeClr val="accent1"/>
+                </a:solidFill>
+                <a:effectLst>
+                  <a:outerShdw blurRad="38100" dist="25400" dir="5400000" algn="ctr" rotWithShape="0">
+                    <a:srgbClr val="6E747A">
+                      <a:alpha val="43000"/>
+                    </a:srgbClr>
+                  </a:outerShdw>
+                </a:effectLst>
+              </a:rPr>
+              <a:t>주인과 노예 노드의 통신</a:t>
+            </a:r>
+            <a:endParaRPr lang="en-US" altLang="ko-KR" sz="3000" b="0" cap="none" spc="0">
+              <a:ln w="0"/>
+              <a:solidFill>
+                <a:schemeClr val="accent1"/>
+              </a:solidFill>
+              <a:effectLst>
+                <a:outerShdw blurRad="38100" dist="25400" dir="5400000" algn="ctr" rotWithShape="0">
+                  <a:srgbClr val="6E747A">
+                    <a:alpha val="43000"/>
+                  </a:srgbClr>
+                </a:outerShdw>
+              </a:effectLst>
+            </a:endParaRPr>
+          </a:p>
+        </p:txBody>
+      </p:sp>
+      <p:grpSp>
+        <p:nvGrpSpPr>
+          <p:cNvPr id="4" name="그룹 3"/>
+          <p:cNvGrpSpPr/>
+          <p:nvPr/>
+        </p:nvGrpSpPr>
+        <p:grpSpPr>
+          <a:xfrm>
+            <a:off x="3688700" y="2155371"/>
+            <a:ext cx="1298122" cy="1094015"/>
+            <a:chOff x="783771" y="1608364"/>
+            <a:chExt cx="1298122" cy="1094015"/>
+          </a:xfrm>
+        </p:grpSpPr>
+        <p:sp>
+          <p:nvSpPr>
+            <p:cNvPr id="3" name="대각선 방향의 모서리가 잘린 사각형 2"/>
+            <p:cNvSpPr/>
+            <p:nvPr/>
+          </p:nvSpPr>
+          <p:spPr>
+            <a:xfrm>
+              <a:off x="783771" y="1608364"/>
+              <a:ext cx="1298122" cy="367393"/>
+            </a:xfrm>
+            <a:prstGeom prst="snip2DiagRect">
+              <a:avLst/>
+            </a:prstGeom>
+          </p:spPr>
+          <p:style>
+            <a:lnRef idx="2">
+              <a:schemeClr val="accent6">
+                <a:shade val="50000"/>
+              </a:schemeClr>
+            </a:lnRef>
+            <a:fillRef idx="1">
+              <a:schemeClr val="accent6"/>
+            </a:fillRef>
+            <a:effectRef idx="0">
+              <a:schemeClr val="accent6"/>
+            </a:effectRef>
+            <a:fontRef idx="minor">
+              <a:schemeClr val="lt1"/>
+            </a:fontRef>
+          </p:style>
+          <p:txBody>
+            <a:bodyPr rtlCol="0" anchor="ctr"/>
+            <a:lstStyle/>
+            <a:p>
+              <a:pPr algn="ctr"/>
+              <a:r>
+                <a:rPr lang="ko-KR" altLang="en-US" sz="1500" smtClean="0"/>
+                <a:t>노예 주소</a:t>
+              </a:r>
+              <a:endParaRPr lang="ko-KR" altLang="en-US" sz="1500"/>
+            </a:p>
+          </p:txBody>
+        </p:sp>
+        <p:sp>
+          <p:nvSpPr>
+            <p:cNvPr id="6" name="대각선 방향의 모서리가 잘린 사각형 5"/>
+            <p:cNvSpPr/>
+            <p:nvPr/>
+          </p:nvSpPr>
+          <p:spPr>
+            <a:xfrm>
+              <a:off x="783771" y="1967593"/>
+              <a:ext cx="1298122" cy="367393"/>
+            </a:xfrm>
+            <a:prstGeom prst="snip2DiagRect">
+              <a:avLst/>
+            </a:prstGeom>
+          </p:spPr>
+          <p:style>
+            <a:lnRef idx="2">
+              <a:schemeClr val="accent4">
+                <a:shade val="50000"/>
+              </a:schemeClr>
+            </a:lnRef>
+            <a:fillRef idx="1">
+              <a:schemeClr val="accent4"/>
+            </a:fillRef>
+            <a:effectRef idx="0">
+              <a:schemeClr val="accent4"/>
+            </a:effectRef>
+            <a:fontRef idx="minor">
+              <a:schemeClr val="lt1"/>
+            </a:fontRef>
+          </p:style>
+          <p:txBody>
+            <a:bodyPr rtlCol="0" anchor="ctr"/>
+            <a:lstStyle/>
+            <a:p>
+              <a:pPr algn="ctr"/>
+              <a:r>
+                <a:rPr lang="ko-KR" altLang="en-US" sz="1500" smtClean="0"/>
+                <a:t>노예 포트</a:t>
+              </a:r>
+              <a:endParaRPr lang="ko-KR" altLang="en-US" sz="1500"/>
+            </a:p>
+          </p:txBody>
+        </p:sp>
+        <p:sp>
+          <p:nvSpPr>
+            <p:cNvPr id="7" name="대각선 방향의 모서리가 잘린 사각형 6"/>
+            <p:cNvSpPr/>
+            <p:nvPr/>
+          </p:nvSpPr>
+          <p:spPr>
+            <a:xfrm>
+              <a:off x="783771" y="2334986"/>
+              <a:ext cx="1298122" cy="367393"/>
+            </a:xfrm>
+            <a:prstGeom prst="snip2DiagRect">
+              <a:avLst/>
+            </a:prstGeom>
+          </p:spPr>
+          <p:style>
+            <a:lnRef idx="2">
+              <a:schemeClr val="accent1">
+                <a:shade val="50000"/>
+              </a:schemeClr>
+            </a:lnRef>
+            <a:fillRef idx="1">
+              <a:schemeClr val="accent1"/>
+            </a:fillRef>
+            <a:effectRef idx="0">
+              <a:schemeClr val="accent1"/>
+            </a:effectRef>
+            <a:fontRef idx="minor">
+              <a:schemeClr val="lt1"/>
+            </a:fontRef>
+          </p:style>
+          <p:txBody>
+            <a:bodyPr rtlCol="0" anchor="ctr"/>
+            <a:lstStyle/>
+            <a:p>
+              <a:pPr algn="ctr"/>
+              <a:r>
+                <a:rPr lang="ko-KR" altLang="en-US" sz="1500" smtClean="0"/>
+                <a:t>샘플 키</a:t>
+              </a:r>
+              <a:endParaRPr lang="ko-KR" altLang="en-US" sz="1500"/>
+            </a:p>
+          </p:txBody>
+        </p:sp>
+      </p:grpSp>
+      <p:sp>
+        <p:nvSpPr>
+          <p:cNvPr id="8" name="TextBox 7"/>
+          <p:cNvSpPr txBox="1"/>
+          <p:nvPr/>
+        </p:nvSpPr>
+        <p:spPr>
+          <a:xfrm>
+            <a:off x="3624942" y="1716352"/>
+            <a:ext cx="1681844" cy="369332"/>
+          </a:xfrm>
+          <a:prstGeom prst="rect">
+            <a:avLst/>
+          </a:prstGeom>
+          <a:noFill/>
+        </p:spPr>
+        <p:txBody>
+          <a:bodyPr wrap="square" rtlCol="0">
+            <a:spAutoFit/>
+          </a:bodyPr>
+          <a:lstStyle/>
+          <a:p>
+            <a:r>
+              <a:rPr lang="ko-KR" altLang="en-US" smtClean="0"/>
+              <a:t>연결 메시지</a:t>
+            </a:r>
+            <a:endParaRPr lang="ko-KR" altLang="en-US"/>
+          </a:p>
+        </p:txBody>
+      </p:sp>
+      <p:sp>
+        <p:nvSpPr>
+          <p:cNvPr id="9" name="모서리가 둥근 직사각형 8"/>
+          <p:cNvSpPr/>
+          <p:nvPr/>
+        </p:nvSpPr>
+        <p:spPr>
+          <a:xfrm>
+            <a:off x="797379" y="1313188"/>
+            <a:ext cx="1741714" cy="457200"/>
+          </a:xfrm>
+          <a:prstGeom prst="roundRect">
+            <a:avLst/>
+          </a:prstGeom>
+          <a:solidFill>
+            <a:schemeClr val="accent1">
+              <a:lumMod val="40000"/>
+              <a:lumOff val="60000"/>
+            </a:schemeClr>
+          </a:solidFill>
+          <a:ln>
+            <a:solidFill>
+              <a:schemeClr val="accent1">
+                <a:lumMod val="75000"/>
+              </a:schemeClr>
+            </a:solidFill>
+          </a:ln>
+        </p:spPr>
+        <p:style>
+          <a:lnRef idx="2">
+            <a:schemeClr val="accent1">
+              <a:shade val="50000"/>
+            </a:schemeClr>
+          </a:lnRef>
+          <a:fillRef idx="1">
+            <a:schemeClr val="accent1"/>
+          </a:fillRef>
+          <a:effectRef idx="0">
+            <a:schemeClr val="accent1"/>
+          </a:effectRef>
+          <a:fontRef idx="minor">
+            <a:schemeClr val="lt1"/>
+          </a:fontRef>
+        </p:style>
+        <p:txBody>
+          <a:bodyPr rtlCol="0" anchor="ctr"/>
+          <a:lstStyle/>
+          <a:p>
+            <a:pPr algn="ctr"/>
+            <a:r>
+              <a:rPr lang="ko-KR" altLang="en-US" smtClean="0">
+                <a:solidFill>
+                  <a:schemeClr val="tx1"/>
+                </a:solidFill>
+              </a:rPr>
+              <a:t>노예 노드 </a:t>
+            </a:r>
+            <a:endParaRPr lang="ko-KR" altLang="en-US">
+              <a:solidFill>
+                <a:schemeClr val="tx1"/>
+              </a:solidFill>
+            </a:endParaRPr>
+          </a:p>
+        </p:txBody>
+      </p:sp>
+      <p:sp>
+        <p:nvSpPr>
+          <p:cNvPr id="10" name="모서리가 둥근 직사각형 9"/>
+          <p:cNvSpPr/>
+          <p:nvPr/>
+        </p:nvSpPr>
+        <p:spPr>
+          <a:xfrm>
+            <a:off x="6392636" y="1313188"/>
+            <a:ext cx="1698171" cy="457200"/>
+          </a:xfrm>
+          <a:prstGeom prst="roundRect">
+            <a:avLst/>
+          </a:prstGeom>
+          <a:solidFill>
+            <a:schemeClr val="accent2">
+              <a:lumMod val="40000"/>
+              <a:lumOff val="60000"/>
+            </a:schemeClr>
+          </a:solidFill>
+          <a:ln>
+            <a:solidFill>
+              <a:schemeClr val="accent2">
+                <a:lumMod val="75000"/>
+              </a:schemeClr>
+            </a:solidFill>
+          </a:ln>
+        </p:spPr>
+        <p:style>
+          <a:lnRef idx="2">
+            <a:schemeClr val="accent1">
+              <a:shade val="50000"/>
+            </a:schemeClr>
+          </a:lnRef>
+          <a:fillRef idx="1">
+            <a:schemeClr val="accent1"/>
+          </a:fillRef>
+          <a:effectRef idx="0">
+            <a:schemeClr val="accent1"/>
+          </a:effectRef>
+          <a:fontRef idx="minor">
+            <a:schemeClr val="lt1"/>
+          </a:fontRef>
+        </p:style>
+        <p:txBody>
+          <a:bodyPr rtlCol="0" anchor="ctr"/>
+          <a:lstStyle/>
+          <a:p>
+            <a:pPr algn="ctr"/>
+            <a:r>
+              <a:rPr lang="ko-KR" altLang="en-US" smtClean="0">
+                <a:solidFill>
+                  <a:schemeClr val="tx1"/>
+                </a:solidFill>
+              </a:rPr>
+              <a:t>주인 노드</a:t>
+            </a:r>
+            <a:endParaRPr lang="ko-KR" altLang="en-US">
+              <a:solidFill>
+                <a:schemeClr val="tx1"/>
+              </a:solidFill>
+            </a:endParaRPr>
+          </a:p>
+        </p:txBody>
+      </p:sp>
+      <p:cxnSp>
+        <p:nvCxnSpPr>
+          <p:cNvPr id="12" name="직선 화살표 연결선 11"/>
+          <p:cNvCxnSpPr>
+            <a:stCxn id="9" idx="3"/>
+            <a:endCxn id="10" idx="1"/>
+          </p:cNvCxnSpPr>
+          <p:nvPr/>
+        </p:nvCxnSpPr>
+        <p:spPr>
+          <a:xfrm>
+            <a:off x="2539093" y="1541788"/>
+            <a:ext cx="3853543" cy="0"/>
+          </a:xfrm>
+          <a:prstGeom prst="straightConnector1">
+            <a:avLst/>
+          </a:prstGeom>
+          <a:ln>
+            <a:tailEnd type="triangle"/>
+          </a:ln>
+        </p:spPr>
+        <p:style>
+          <a:lnRef idx="1">
+            <a:schemeClr val="accent1"/>
+          </a:lnRef>
+          <a:fillRef idx="0">
+            <a:schemeClr val="accent1"/>
+          </a:fillRef>
+          <a:effectRef idx="0">
+            <a:schemeClr val="accent1"/>
+          </a:effectRef>
+          <a:fontRef idx="minor">
+            <a:schemeClr val="tx1"/>
+          </a:fontRef>
+        </p:style>
+      </p:cxnSp>
+      <p:cxnSp>
+        <p:nvCxnSpPr>
+          <p:cNvPr id="14" name="직선 화살표 연결선 13"/>
+          <p:cNvCxnSpPr>
+            <a:stCxn id="10" idx="2"/>
+            <a:endCxn id="16" idx="0"/>
+          </p:cNvCxnSpPr>
+          <p:nvPr/>
+        </p:nvCxnSpPr>
+        <p:spPr>
+          <a:xfrm flipH="1">
+            <a:off x="7241721" y="1770388"/>
+            <a:ext cx="1" cy="2183269"/>
+          </a:xfrm>
+          <a:prstGeom prst="straightConnector1">
+            <a:avLst/>
+          </a:prstGeom>
+          <a:ln>
+            <a:tailEnd type="triangle"/>
+          </a:ln>
+        </p:spPr>
+        <p:style>
+          <a:lnRef idx="1">
+            <a:schemeClr val="accent2"/>
+          </a:lnRef>
+          <a:fillRef idx="0">
+            <a:schemeClr val="accent2"/>
+          </a:fillRef>
+          <a:effectRef idx="0">
+            <a:schemeClr val="accent2"/>
+          </a:effectRef>
+          <a:fontRef idx="minor">
+            <a:schemeClr val="tx1"/>
+          </a:fontRef>
+        </p:style>
+      </p:cxnSp>
+      <p:sp>
+        <p:nvSpPr>
+          <p:cNvPr id="15" name="TextBox 14"/>
+          <p:cNvSpPr txBox="1"/>
+          <p:nvPr/>
+        </p:nvSpPr>
+        <p:spPr>
+          <a:xfrm>
+            <a:off x="7249885" y="2328964"/>
+            <a:ext cx="2881994" cy="369332"/>
+          </a:xfrm>
+          <a:prstGeom prst="rect">
+            <a:avLst/>
+          </a:prstGeom>
+          <a:noFill/>
+        </p:spPr>
+        <p:txBody>
+          <a:bodyPr wrap="square" rtlCol="0">
+            <a:spAutoFit/>
+          </a:bodyPr>
+          <a:lstStyle/>
+          <a:p>
+            <a:r>
+              <a:rPr lang="ko-KR" altLang="en-US" smtClean="0"/>
+              <a:t>모든 노예 노드 연결 대기</a:t>
+            </a:r>
+            <a:endParaRPr lang="ko-KR" altLang="en-US"/>
+          </a:p>
+        </p:txBody>
+      </p:sp>
+      <p:sp>
+        <p:nvSpPr>
+          <p:cNvPr id="16" name="모서리가 둥근 직사각형 15"/>
+          <p:cNvSpPr/>
+          <p:nvPr/>
+        </p:nvSpPr>
+        <p:spPr>
+          <a:xfrm>
+            <a:off x="6392635" y="3953657"/>
+            <a:ext cx="1698171" cy="457200"/>
+          </a:xfrm>
+          <a:prstGeom prst="roundRect">
+            <a:avLst/>
+          </a:prstGeom>
+          <a:solidFill>
+            <a:schemeClr val="accent2">
+              <a:lumMod val="40000"/>
+              <a:lumOff val="60000"/>
+            </a:schemeClr>
+          </a:solidFill>
+          <a:ln>
+            <a:solidFill>
+              <a:schemeClr val="accent2">
+                <a:lumMod val="75000"/>
+              </a:schemeClr>
+            </a:solidFill>
+          </a:ln>
+        </p:spPr>
+        <p:style>
+          <a:lnRef idx="2">
+            <a:schemeClr val="accent1">
+              <a:shade val="50000"/>
+            </a:schemeClr>
+          </a:lnRef>
+          <a:fillRef idx="1">
+            <a:schemeClr val="accent1"/>
+          </a:fillRef>
+          <a:effectRef idx="0">
+            <a:schemeClr val="accent1"/>
+          </a:effectRef>
+          <a:fontRef idx="minor">
+            <a:schemeClr val="lt1"/>
+          </a:fontRef>
+        </p:style>
+        <p:txBody>
+          <a:bodyPr rtlCol="0" anchor="ctr"/>
+          <a:lstStyle/>
+          <a:p>
+            <a:pPr algn="ctr"/>
+            <a:r>
+              <a:rPr lang="ko-KR" altLang="en-US" smtClean="0">
+                <a:solidFill>
+                  <a:schemeClr val="tx1"/>
+                </a:solidFill>
+              </a:rPr>
+              <a:t>주인 노드</a:t>
+            </a:r>
+            <a:endParaRPr lang="ko-KR" altLang="en-US">
+              <a:solidFill>
+                <a:schemeClr val="tx1"/>
+              </a:solidFill>
+            </a:endParaRPr>
+          </a:p>
+        </p:txBody>
+      </p:sp>
+      <p:cxnSp>
+        <p:nvCxnSpPr>
+          <p:cNvPr id="19" name="직선 화살표 연결선 18"/>
+          <p:cNvCxnSpPr>
+            <a:stCxn id="16" idx="1"/>
+            <a:endCxn id="20" idx="3"/>
+          </p:cNvCxnSpPr>
+          <p:nvPr/>
+        </p:nvCxnSpPr>
+        <p:spPr>
+          <a:xfrm flipH="1">
+            <a:off x="2539093" y="4182257"/>
+            <a:ext cx="3853542" cy="0"/>
+          </a:xfrm>
+          <a:prstGeom prst="straightConnector1">
+            <a:avLst/>
+          </a:prstGeom>
+          <a:ln>
+            <a:tailEnd type="triangle"/>
+          </a:ln>
+        </p:spPr>
+        <p:style>
+          <a:lnRef idx="1">
+            <a:schemeClr val="accent2"/>
+          </a:lnRef>
+          <a:fillRef idx="0">
+            <a:schemeClr val="accent2"/>
+          </a:fillRef>
+          <a:effectRef idx="0">
+            <a:schemeClr val="accent2"/>
+          </a:effectRef>
+          <a:fontRef idx="minor">
+            <a:schemeClr val="tx1"/>
+          </a:fontRef>
+        </p:style>
+      </p:cxnSp>
+      <p:sp>
+        <p:nvSpPr>
+          <p:cNvPr id="20" name="모서리가 둥근 직사각형 19"/>
+          <p:cNvSpPr/>
+          <p:nvPr/>
+        </p:nvSpPr>
+        <p:spPr>
+          <a:xfrm>
+            <a:off x="797379" y="3953657"/>
+            <a:ext cx="1741714" cy="457200"/>
+          </a:xfrm>
+          <a:prstGeom prst="roundRect">
+            <a:avLst/>
+          </a:prstGeom>
+          <a:solidFill>
+            <a:schemeClr val="accent1">
+              <a:lumMod val="40000"/>
+              <a:lumOff val="60000"/>
+            </a:schemeClr>
+          </a:solidFill>
+          <a:ln>
+            <a:solidFill>
+              <a:schemeClr val="accent1">
+                <a:lumMod val="75000"/>
+              </a:schemeClr>
+            </a:solidFill>
+          </a:ln>
+        </p:spPr>
+        <p:style>
+          <a:lnRef idx="2">
+            <a:schemeClr val="accent1">
+              <a:shade val="50000"/>
+            </a:schemeClr>
+          </a:lnRef>
+          <a:fillRef idx="1">
+            <a:schemeClr val="accent1"/>
+          </a:fillRef>
+          <a:effectRef idx="0">
+            <a:schemeClr val="accent1"/>
+          </a:effectRef>
+          <a:fontRef idx="minor">
+            <a:schemeClr val="lt1"/>
+          </a:fontRef>
+        </p:style>
+        <p:txBody>
+          <a:bodyPr rtlCol="0" anchor="ctr"/>
+          <a:lstStyle/>
+          <a:p>
+            <a:pPr algn="ctr"/>
+            <a:r>
+              <a:rPr lang="ko-KR" altLang="en-US" smtClean="0">
+                <a:solidFill>
+                  <a:schemeClr val="tx1"/>
+                </a:solidFill>
+              </a:rPr>
+              <a:t>노예 노드 </a:t>
+            </a:r>
+            <a:endParaRPr lang="ko-KR" altLang="en-US">
+              <a:solidFill>
+                <a:schemeClr val="tx1"/>
+              </a:solidFill>
+            </a:endParaRPr>
+          </a:p>
+        </p:txBody>
+      </p:sp>
+      <p:sp>
+        <p:nvSpPr>
+          <p:cNvPr id="24" name="TextBox 23"/>
+          <p:cNvSpPr txBox="1"/>
+          <p:nvPr/>
+        </p:nvSpPr>
+        <p:spPr>
+          <a:xfrm>
+            <a:off x="3624942" y="4312887"/>
+            <a:ext cx="1681844" cy="369332"/>
+          </a:xfrm>
+          <a:prstGeom prst="rect">
+            <a:avLst/>
+          </a:prstGeom>
+          <a:noFill/>
+        </p:spPr>
+        <p:txBody>
+          <a:bodyPr wrap="square" rtlCol="0">
+            <a:spAutoFit/>
+          </a:bodyPr>
+          <a:lstStyle/>
+          <a:p>
+            <a:r>
+              <a:rPr lang="ko-KR" altLang="en-US" smtClean="0"/>
+              <a:t>할당 범위</a:t>
+            </a:r>
+            <a:endParaRPr lang="ko-KR" altLang="en-US"/>
+          </a:p>
+        </p:txBody>
+      </p:sp>
+      <p:sp>
+        <p:nvSpPr>
+          <p:cNvPr id="25" name="대각선 방향의 모서리가 잘린 사각형 24"/>
+          <p:cNvSpPr/>
+          <p:nvPr/>
+        </p:nvSpPr>
+        <p:spPr>
+          <a:xfrm>
+            <a:off x="3251132" y="4726152"/>
+            <a:ext cx="2173257" cy="367393"/>
+          </a:xfrm>
+          <a:prstGeom prst="snip2DiagRect">
+            <a:avLst/>
+          </a:prstGeom>
+        </p:spPr>
+        <p:style>
+          <a:lnRef idx="2">
+            <a:schemeClr val="accent2">
+              <a:shade val="50000"/>
+            </a:schemeClr>
+          </a:lnRef>
+          <a:fillRef idx="1">
+            <a:schemeClr val="accent2"/>
+          </a:fillRef>
+          <a:effectRef idx="0">
+            <a:schemeClr val="accent2"/>
+          </a:effectRef>
+          <a:fontRef idx="minor">
+            <a:schemeClr val="lt1"/>
+          </a:fontRef>
+        </p:style>
+        <p:txBody>
+          <a:bodyPr rtlCol="0" anchor="ctr"/>
+          <a:lstStyle/>
+          <a:p>
+            <a:pPr algn="ctr"/>
+            <a:r>
+              <a:rPr lang="ko-KR" altLang="en-US" sz="1500" smtClean="0"/>
+              <a:t>시작 범위</a:t>
+            </a:r>
+            <a:r>
+              <a:rPr lang="en-US" altLang="ko-KR" sz="1500" smtClean="0"/>
+              <a:t>, </a:t>
+            </a:r>
+            <a:r>
+              <a:rPr lang="ko-KR" altLang="en-US" sz="1500" smtClean="0"/>
+              <a:t>끝범위</a:t>
+            </a:r>
+            <a:endParaRPr lang="ko-KR" altLang="en-US" sz="1500"/>
+          </a:p>
+        </p:txBody>
+      </p:sp>
+    </p:spTree>
+    <p:extLst>
+      <p:ext uri="{BB962C8B-B14F-4D97-AF65-F5344CB8AC3E}">
+        <p14:creationId xmlns:p14="http://schemas.microsoft.com/office/powerpoint/2010/main" val="1798733947"/>
+      </p:ext>
+    </p:extLst>
+  </p:cSld>
+  <p:clrMapOvr>
+    <a:masterClrMapping/>
+  </p:clrMapOvr>
+</p:sld>
+</file>
+
 <file path=ppt/slides/slide2.xml><?xml version="1.0" encoding="utf-8"?>
 <p:sld xmlns:a="http://schemas.openxmlformats.org/drawingml/2006/main" xmlns:r="http://schemas.openxmlformats.org/officeDocument/2006/relationships" xmlns:p="http://schemas.openxmlformats.org/presentationml/2006/main">
   <p:cSld>
@@ -3809,8 +4551,8 @@
           </a:p>
         </p:txBody>
       </p:sp>
-      <mc:AlternateContent xmlns:mc="http://schemas.openxmlformats.org/markup-compatibility/2006">
-        <mc:Choice xmlns:a14="http://schemas.microsoft.com/office/drawing/2010/main" Requires="a14">
+      <mc:AlternateContent xmlns:mc="http://schemas.openxmlformats.org/markup-compatibility/2006" xmlns:a14="http://schemas.microsoft.com/office/drawing/2010/main">
+        <mc:Choice Requires="a14">
           <p:sp>
             <p:nvSpPr>
               <p:cNvPr id="5" name="TextBox 4"/>
@@ -3877,11 +4619,7 @@
                 </a:r>
                 <a:r>
                   <a:rPr lang="en-US" altLang="ko-KR" smtClean="0"/>
-                  <a:t>? </a:t>
-                </a:r>
-                <a:r>
-                  <a:rPr lang="en-US" altLang="ko-KR" smtClean="0"/>
-                  <a:t>constructor</a:t>
+                  <a:t>? constructor</a:t>
                 </a:r>
                 <a:r>
                   <a:rPr lang="ko-KR" altLang="en-US" smtClean="0"/>
@@ -4016,7 +4754,7 @@
             </p:txBody>
           </p:sp>
         </mc:Choice>
-        <mc:Fallback>
+        <mc:Fallback xmlns="">
           <p:sp>
             <p:nvSpPr>
               <p:cNvPr id="5" name="TextBox 4"/>

</xml_diff>